<commit_message>
Mise a jour du journal d'activités
</commit_message>
<xml_diff>
--- a/Cyril/Présentation.pptx
+++ b/Cyril/Présentation.pptx
@@ -846,7 +846,7 @@
             <a:fld id="{B61BEF0D-F0BB-DE4B-95CE-6DB70DBA9567}" type="datetimeFigureOut">
               <a:rPr lang="en-US" dirty="0"/>
               <a:pPr/>
-              <a:t>1/22/2020</a:t>
+              <a:t>1/28/2020</a:t>
             </a:fld>
             <a:endParaRPr lang="en-US" dirty="0"/>
           </a:p>
@@ -1094,7 +1094,7 @@
             <a:fld id="{B61BEF0D-F0BB-DE4B-95CE-6DB70DBA9567}" type="datetimeFigureOut">
               <a:rPr lang="en-US" dirty="0"/>
               <a:pPr/>
-              <a:t>1/22/2020</a:t>
+              <a:t>1/28/2020</a:t>
             </a:fld>
             <a:endParaRPr lang="en-US" dirty="0"/>
           </a:p>
@@ -1405,7 +1405,7 @@
             <a:fld id="{B61BEF0D-F0BB-DE4B-95CE-6DB70DBA9567}" type="datetimeFigureOut">
               <a:rPr lang="en-US" dirty="0"/>
               <a:pPr/>
-              <a:t>1/22/2020</a:t>
+              <a:t>1/28/2020</a:t>
             </a:fld>
             <a:endParaRPr lang="en-US" dirty="0"/>
           </a:p>
@@ -1743,7 +1743,7 @@
             <a:fld id="{B61BEF0D-F0BB-DE4B-95CE-6DB70DBA9567}" type="datetimeFigureOut">
               <a:rPr lang="en-US" dirty="0"/>
               <a:pPr/>
-              <a:t>1/22/2020</a:t>
+              <a:t>1/28/2020</a:t>
             </a:fld>
             <a:endParaRPr lang="en-US" dirty="0"/>
           </a:p>
@@ -2054,7 +2054,7 @@
             <a:fld id="{B61BEF0D-F0BB-DE4B-95CE-6DB70DBA9567}" type="datetimeFigureOut">
               <a:rPr lang="en-US" dirty="0"/>
               <a:pPr/>
-              <a:t>1/22/2020</a:t>
+              <a:t>1/28/2020</a:t>
             </a:fld>
             <a:endParaRPr lang="en-US" dirty="0"/>
           </a:p>
@@ -2444,7 +2444,7 @@
             <a:fld id="{B61BEF0D-F0BB-DE4B-95CE-6DB70DBA9567}" type="datetimeFigureOut">
               <a:rPr lang="en-US" dirty="0"/>
               <a:pPr/>
-              <a:t>1/22/2020</a:t>
+              <a:t>1/28/2020</a:t>
             </a:fld>
             <a:endParaRPr lang="en-US" dirty="0"/>
           </a:p>
@@ -2610,7 +2610,7 @@
           <a:p>
             <a:fld id="{55C6B4A9-1611-4792-9094-5F34BCA07E0B}" type="datetimeFigureOut">
               <a:rPr lang="en-US" dirty="0"/>
-              <a:t>1/22/2020</a:t>
+              <a:t>1/28/2020</a:t>
             </a:fld>
             <a:endParaRPr lang="en-US" dirty="0"/>
           </a:p>
@@ -2786,7 +2786,7 @@
             <a:fld id="{B61BEF0D-F0BB-DE4B-95CE-6DB70DBA9567}" type="datetimeFigureOut">
               <a:rPr lang="en-US" dirty="0"/>
               <a:pPr/>
-              <a:t>1/22/2020</a:t>
+              <a:t>1/28/2020</a:t>
             </a:fld>
             <a:endParaRPr lang="en-US" dirty="0"/>
           </a:p>
@@ -2959,7 +2959,7 @@
             <a:fld id="{B61BEF0D-F0BB-DE4B-95CE-6DB70DBA9567}" type="datetimeFigureOut">
               <a:rPr lang="en-US" dirty="0"/>
               <a:pPr/>
-              <a:t>1/22/2020</a:t>
+              <a:t>1/28/2020</a:t>
             </a:fld>
             <a:endParaRPr lang="en-US" dirty="0"/>
           </a:p>
@@ -3203,7 +3203,7 @@
             <a:fld id="{B61BEF0D-F0BB-DE4B-95CE-6DB70DBA9567}" type="datetimeFigureOut">
               <a:rPr lang="en-US" dirty="0"/>
               <a:pPr/>
-              <a:t>1/22/2020</a:t>
+              <a:t>1/28/2020</a:t>
             </a:fld>
             <a:endParaRPr lang="en-US" dirty="0"/>
           </a:p>
@@ -3431,7 +3431,7 @@
           <a:p>
             <a:fld id="{EB712588-04B1-427B-82EE-E8DB90309F08}" type="datetimeFigureOut">
               <a:rPr lang="en-US" dirty="0"/>
-              <a:t>1/22/2020</a:t>
+              <a:t>1/28/2020</a:t>
             </a:fld>
             <a:endParaRPr lang="en-US" dirty="0"/>
           </a:p>
@@ -3801,7 +3801,7 @@
             <a:fld id="{B61BEF0D-F0BB-DE4B-95CE-6DB70DBA9567}" type="datetimeFigureOut">
               <a:rPr lang="en-US" dirty="0"/>
               <a:pPr/>
-              <a:t>1/22/2020</a:t>
+              <a:t>1/28/2020</a:t>
             </a:fld>
             <a:endParaRPr lang="en-US" dirty="0"/>
           </a:p>
@@ -3921,7 +3921,7 @@
             <a:fld id="{B61BEF0D-F0BB-DE4B-95CE-6DB70DBA9567}" type="datetimeFigureOut">
               <a:rPr lang="en-US" dirty="0"/>
               <a:pPr/>
-              <a:t>1/22/2020</a:t>
+              <a:t>1/28/2020</a:t>
             </a:fld>
             <a:endParaRPr lang="en-US" dirty="0"/>
           </a:p>
@@ -4013,7 +4013,7 @@
             <a:fld id="{B61BEF0D-F0BB-DE4B-95CE-6DB70DBA9567}" type="datetimeFigureOut">
               <a:rPr lang="en-US" dirty="0"/>
               <a:pPr/>
-              <a:t>1/22/2020</a:t>
+              <a:t>1/28/2020</a:t>
             </a:fld>
             <a:endParaRPr lang="en-US" dirty="0"/>
           </a:p>
@@ -4264,7 +4264,7 @@
           <a:p>
             <a:fld id="{42A54C80-263E-416B-A8E0-580EDEADCBDC}" type="datetimeFigureOut">
               <a:rPr lang="en-US" dirty="0"/>
-              <a:t>1/22/2020</a:t>
+              <a:t>1/28/2020</a:t>
             </a:fld>
             <a:endParaRPr lang="en-US" dirty="0"/>
           </a:p>
@@ -4523,7 +4523,7 @@
             <a:fld id="{B61BEF0D-F0BB-DE4B-95CE-6DB70DBA9567}" type="datetimeFigureOut">
               <a:rPr lang="en-US" dirty="0"/>
               <a:pPr/>
-              <a:t>1/22/2020</a:t>
+              <a:t>1/28/2020</a:t>
             </a:fld>
             <a:endParaRPr lang="en-US" dirty="0"/>
           </a:p>
@@ -5263,7 +5263,7 @@
             <a:fld id="{B61BEF0D-F0BB-DE4B-95CE-6DB70DBA9567}" type="datetimeFigureOut">
               <a:rPr lang="en-US" dirty="0"/>
               <a:pPr/>
-              <a:t>1/22/2020</a:t>
+              <a:t>1/28/2020</a:t>
             </a:fld>
             <a:endParaRPr lang="en-US" dirty="0"/>
           </a:p>
@@ -9175,7 +9175,7 @@
             </a:r>
             <a:r>
               <a:rPr lang="fr-FR" dirty="0"/>
-              <a:t>Créer un fichier HTML contenant la structure du formulaire</a:t>
+              <a:t>Créer un fichier HTML</a:t>
             </a:r>
             <a:br>
               <a:rPr lang="fr-FR" dirty="0"/>
@@ -9190,7 +9190,7 @@
             </a:r>
             <a:r>
               <a:rPr lang="fr-FR" dirty="0"/>
-              <a:t> Créer un fichier CSS pour définir le style</a:t>
+              <a:t> Créer un fichier CSS</a:t>
             </a:r>
             <a:br>
               <a:rPr lang="fr-FR" dirty="0"/>
@@ -9205,7 +9205,7 @@
             </a:r>
             <a:r>
               <a:rPr lang="fr-FR" dirty="0"/>
-              <a:t> Créer un fichier de login PHP qui va vérifie les champs de formulaire si ils correspondent aux valeurs de la table dans la base de données</a:t>
+              <a:t> Créer un fichier de login PHP</a:t>
             </a:r>
             <a:br>
               <a:rPr lang="fr-FR" dirty="0"/>
@@ -9424,7 +9424,7 @@
         </p:nvSpPr>
         <p:spPr bwMode="auto">
           <a:xfrm>
-            <a:off x="4772680" y="3887041"/>
+            <a:off x="4772680" y="2596269"/>
             <a:ext cx="4501322" cy="584775"/>
           </a:xfrm>
           <a:prstGeom prst="rect">
@@ -9679,62 +9679,6 @@
               <a:effectLst/>
               <a:latin typeface="Arial" panose="020B0604020202020204" pitchFamily="34" charset="0"/>
             </a:endParaRPr>
-          </a:p>
-        </p:txBody>
-      </p:sp>
-      <p:sp>
-        <p:nvSpPr>
-          <p:cNvPr id="7" name="Rectangle 6">
-            <a:extLst>
-              <a:ext uri="{FF2B5EF4-FFF2-40B4-BE49-F238E27FC236}">
-                <a16:creationId xmlns:a16="http://schemas.microsoft.com/office/drawing/2014/main" id="{0035089E-4188-4B55-819C-18C043FAC5D8}"/>
-              </a:ext>
-            </a:extLst>
-          </p:cNvPr>
-          <p:cNvSpPr/>
-          <p:nvPr/>
-        </p:nvSpPr>
-        <p:spPr>
-          <a:xfrm>
-            <a:off x="4625802" y="2473533"/>
-            <a:ext cx="5360020" cy="1169551"/>
-          </a:xfrm>
-          <a:prstGeom prst="rect">
-            <a:avLst/>
-          </a:prstGeom>
-        </p:spPr>
-        <p:txBody>
-          <a:bodyPr wrap="square">
-            <a:spAutoFit/>
-          </a:bodyPr>
-          <a:lstStyle/>
-          <a:p>
-            <a:pPr algn="just"/>
-            <a:r>
-              <a:rPr lang="fr-FR" sz="1400" dirty="0">
-                <a:solidFill>
-                  <a:schemeClr val="tx1">
-                    <a:lumMod val="75000"/>
-                    <a:lumOff val="25000"/>
-                  </a:schemeClr>
-                </a:solidFill>
-              </a:rPr>
-              <a:t>Ce qui autorise DUBOIS à lancer sur la table T_CHAMBRE (SELECT, INSERT, DELETE).</a:t>
-            </a:r>
-          </a:p>
-          <a:p>
-            <a:pPr algn="just"/>
-            <a:r>
-              <a:rPr lang="fr-FR" sz="1400" dirty="0">
-                <a:solidFill>
-                  <a:schemeClr val="tx1">
-                    <a:lumMod val="75000"/>
-                    <a:lumOff val="25000"/>
-                  </a:schemeClr>
-                </a:solidFill>
-              </a:rPr>
-              <a:t>On parle alors d'héritage de droits c'est à dire que l'utilisateur dotés de ces droits peut à nouveau les céder à un ou plusieurs autres utilisateurs.</a:t>
-            </a:r>
           </a:p>
         </p:txBody>
       </p:sp>

</xml_diff>

<commit_message>
mise a jour PowerPoint
</commit_message>
<xml_diff>
--- a/Cyril/Présentation.pptx
+++ b/Cyril/Présentation.pptx
@@ -121,6 +121,2802 @@
     </p:ext>
   </p:extLst>
 </p:presentation>
+</file>
+
+<file path=ppt/diagrams/colors1.xml><?xml version="1.0" encoding="utf-8"?>
+<dgm:colorsDef xmlns:dgm="http://schemas.openxmlformats.org/drawingml/2006/diagram" xmlns:a="http://schemas.openxmlformats.org/drawingml/2006/main" uniqueId="urn:microsoft.com/office/officeart/2005/8/colors/accent0_3">
+  <dgm:title val=""/>
+  <dgm:desc val=""/>
+  <dgm:catLst>
+    <dgm:cat type="mainScheme" pri="10300"/>
+  </dgm:catLst>
+  <dgm:styleLbl name="node0">
+    <dgm:fillClrLst meth="repeat">
+      <a:schemeClr val="dk2"/>
+    </dgm:fillClrLst>
+    <dgm:linClrLst meth="repeat">
+      <a:schemeClr val="lt2"/>
+    </dgm:linClrLst>
+    <dgm:effectClrLst/>
+    <dgm:txLinClrLst/>
+    <dgm:txFillClrLst/>
+    <dgm:txEffectClrLst/>
+  </dgm:styleLbl>
+  <dgm:styleLbl name="alignNode1">
+    <dgm:fillClrLst meth="repeat">
+      <a:schemeClr val="dk2"/>
+    </dgm:fillClrLst>
+    <dgm:linClrLst meth="repeat">
+      <a:schemeClr val="dk2"/>
+    </dgm:linClrLst>
+    <dgm:effectClrLst/>
+    <dgm:txLinClrLst/>
+    <dgm:txFillClrLst/>
+    <dgm:txEffectClrLst/>
+  </dgm:styleLbl>
+  <dgm:styleLbl name="node1">
+    <dgm:fillClrLst meth="repeat">
+      <a:schemeClr val="dk2"/>
+    </dgm:fillClrLst>
+    <dgm:linClrLst meth="repeat">
+      <a:schemeClr val="lt2"/>
+    </dgm:linClrLst>
+    <dgm:effectClrLst/>
+    <dgm:txLinClrLst/>
+    <dgm:txFillClrLst/>
+    <dgm:txEffectClrLst/>
+  </dgm:styleLbl>
+  <dgm:styleLbl name="lnNode1">
+    <dgm:fillClrLst meth="repeat">
+      <a:schemeClr val="dk2"/>
+    </dgm:fillClrLst>
+    <dgm:linClrLst meth="repeat">
+      <a:schemeClr val="lt2"/>
+    </dgm:linClrLst>
+    <dgm:effectClrLst/>
+    <dgm:txLinClrLst/>
+    <dgm:txFillClrLst/>
+    <dgm:txEffectClrLst/>
+  </dgm:styleLbl>
+  <dgm:styleLbl name="vennNode1">
+    <dgm:fillClrLst meth="repeat">
+      <a:schemeClr val="dk2">
+        <a:alpha val="50000"/>
+      </a:schemeClr>
+    </dgm:fillClrLst>
+    <dgm:linClrLst meth="repeat">
+      <a:schemeClr val="lt2"/>
+    </dgm:linClrLst>
+    <dgm:effectClrLst/>
+    <dgm:txLinClrLst/>
+    <dgm:txFillClrLst/>
+    <dgm:txEffectClrLst/>
+  </dgm:styleLbl>
+  <dgm:styleLbl name="node2">
+    <dgm:fillClrLst meth="repeat">
+      <a:schemeClr val="dk2"/>
+    </dgm:fillClrLst>
+    <dgm:linClrLst meth="repeat">
+      <a:schemeClr val="lt2"/>
+    </dgm:linClrLst>
+    <dgm:effectClrLst/>
+    <dgm:txLinClrLst/>
+    <dgm:txFillClrLst/>
+    <dgm:txEffectClrLst/>
+  </dgm:styleLbl>
+  <dgm:styleLbl name="node3">
+    <dgm:fillClrLst meth="repeat">
+      <a:schemeClr val="dk2"/>
+    </dgm:fillClrLst>
+    <dgm:linClrLst meth="repeat">
+      <a:schemeClr val="lt2"/>
+    </dgm:linClrLst>
+    <dgm:effectClrLst/>
+    <dgm:txLinClrLst/>
+    <dgm:txFillClrLst/>
+    <dgm:txEffectClrLst/>
+  </dgm:styleLbl>
+  <dgm:styleLbl name="node4">
+    <dgm:fillClrLst meth="repeat">
+      <a:schemeClr val="dk2"/>
+    </dgm:fillClrLst>
+    <dgm:linClrLst meth="repeat">
+      <a:schemeClr val="lt2"/>
+    </dgm:linClrLst>
+    <dgm:effectClrLst/>
+    <dgm:txLinClrLst/>
+    <dgm:txFillClrLst/>
+    <dgm:txEffectClrLst/>
+  </dgm:styleLbl>
+  <dgm:styleLbl name="fgImgPlace1">
+    <dgm:fillClrLst meth="repeat">
+      <a:schemeClr val="dk2">
+        <a:tint val="50000"/>
+      </a:schemeClr>
+    </dgm:fillClrLst>
+    <dgm:linClrLst meth="repeat">
+      <a:schemeClr val="lt2"/>
+    </dgm:linClrLst>
+    <dgm:effectClrLst/>
+    <dgm:txLinClrLst/>
+    <dgm:txFillClrLst meth="repeat">
+      <a:schemeClr val="lt2"/>
+    </dgm:txFillClrLst>
+    <dgm:txEffectClrLst/>
+  </dgm:styleLbl>
+  <dgm:styleLbl name="alignImgPlace1">
+    <dgm:fillClrLst meth="repeat">
+      <a:schemeClr val="dk2">
+        <a:tint val="50000"/>
+      </a:schemeClr>
+    </dgm:fillClrLst>
+    <dgm:linClrLst meth="repeat">
+      <a:schemeClr val="dk2">
+        <a:shade val="80000"/>
+      </a:schemeClr>
+    </dgm:linClrLst>
+    <dgm:effectClrLst/>
+    <dgm:txLinClrLst/>
+    <dgm:txFillClrLst meth="repeat">
+      <a:schemeClr val="lt2"/>
+    </dgm:txFillClrLst>
+    <dgm:txEffectClrLst/>
+  </dgm:styleLbl>
+  <dgm:styleLbl name="bgImgPlace1">
+    <dgm:fillClrLst meth="repeat">
+      <a:schemeClr val="dk2">
+        <a:tint val="50000"/>
+      </a:schemeClr>
+    </dgm:fillClrLst>
+    <dgm:linClrLst meth="repeat">
+      <a:schemeClr val="dk2">
+        <a:shade val="80000"/>
+      </a:schemeClr>
+    </dgm:linClrLst>
+    <dgm:effectClrLst/>
+    <dgm:txLinClrLst/>
+    <dgm:txFillClrLst meth="repeat">
+      <a:schemeClr val="lt2"/>
+    </dgm:txFillClrLst>
+    <dgm:txEffectClrLst/>
+  </dgm:styleLbl>
+  <dgm:styleLbl name="sibTrans2D1">
+    <dgm:fillClrLst meth="repeat">
+      <a:schemeClr val="dk2">
+        <a:tint val="60000"/>
+      </a:schemeClr>
+    </dgm:fillClrLst>
+    <dgm:linClrLst meth="repeat">
+      <a:schemeClr val="dk2">
+        <a:tint val="60000"/>
+      </a:schemeClr>
+    </dgm:linClrLst>
+    <dgm:effectClrLst/>
+    <dgm:txLinClrLst/>
+    <dgm:txFillClrLst/>
+    <dgm:txEffectClrLst/>
+  </dgm:styleLbl>
+  <dgm:styleLbl name="fgSibTrans2D1">
+    <dgm:fillClrLst meth="repeat">
+      <a:schemeClr val="dk2">
+        <a:tint val="60000"/>
+      </a:schemeClr>
+    </dgm:fillClrLst>
+    <dgm:linClrLst meth="repeat">
+      <a:schemeClr val="dk2">
+        <a:tint val="60000"/>
+      </a:schemeClr>
+    </dgm:linClrLst>
+    <dgm:effectClrLst/>
+    <dgm:txLinClrLst/>
+    <dgm:txFillClrLst/>
+    <dgm:txEffectClrLst/>
+  </dgm:styleLbl>
+  <dgm:styleLbl name="bgSibTrans2D1">
+    <dgm:fillClrLst meth="repeat">
+      <a:schemeClr val="dk2">
+        <a:tint val="60000"/>
+      </a:schemeClr>
+    </dgm:fillClrLst>
+    <dgm:linClrLst meth="repeat">
+      <a:schemeClr val="dk2">
+        <a:tint val="60000"/>
+      </a:schemeClr>
+    </dgm:linClrLst>
+    <dgm:effectClrLst/>
+    <dgm:txLinClrLst/>
+    <dgm:txFillClrLst/>
+    <dgm:txEffectClrLst/>
+  </dgm:styleLbl>
+  <dgm:styleLbl name="sibTrans1D1">
+    <dgm:fillClrLst meth="repeat">
+      <a:schemeClr val="dk2"/>
+    </dgm:fillClrLst>
+    <dgm:linClrLst meth="repeat">
+      <a:schemeClr val="dk2"/>
+    </dgm:linClrLst>
+    <dgm:effectClrLst/>
+    <dgm:txLinClrLst/>
+    <dgm:txFillClrLst meth="repeat">
+      <a:schemeClr val="lt2"/>
+    </dgm:txFillClrLst>
+    <dgm:txEffectClrLst/>
+  </dgm:styleLbl>
+  <dgm:styleLbl name="callout">
+    <dgm:fillClrLst meth="repeat">
+      <a:schemeClr val="dk2"/>
+    </dgm:fillClrLst>
+    <dgm:linClrLst meth="repeat">
+      <a:schemeClr val="dk2">
+        <a:tint val="50000"/>
+      </a:schemeClr>
+    </dgm:linClrLst>
+    <dgm:effectClrLst/>
+    <dgm:txLinClrLst/>
+    <dgm:txFillClrLst meth="repeat">
+      <a:schemeClr val="lt2"/>
+    </dgm:txFillClrLst>
+    <dgm:txEffectClrLst/>
+  </dgm:styleLbl>
+  <dgm:styleLbl name="asst0">
+    <dgm:fillClrLst meth="repeat">
+      <a:schemeClr val="dk2"/>
+    </dgm:fillClrLst>
+    <dgm:linClrLst meth="repeat">
+      <a:schemeClr val="lt2"/>
+    </dgm:linClrLst>
+    <dgm:effectClrLst/>
+    <dgm:txLinClrLst/>
+    <dgm:txFillClrLst/>
+    <dgm:txEffectClrLst/>
+  </dgm:styleLbl>
+  <dgm:styleLbl name="asst1">
+    <dgm:fillClrLst meth="repeat">
+      <a:schemeClr val="dk2"/>
+    </dgm:fillClrLst>
+    <dgm:linClrLst meth="repeat">
+      <a:schemeClr val="lt2"/>
+    </dgm:linClrLst>
+    <dgm:effectClrLst/>
+    <dgm:txLinClrLst/>
+    <dgm:txFillClrLst/>
+    <dgm:txEffectClrLst/>
+  </dgm:styleLbl>
+  <dgm:styleLbl name="asst2">
+    <dgm:fillClrLst meth="repeat">
+      <a:schemeClr val="dk2"/>
+    </dgm:fillClrLst>
+    <dgm:linClrLst meth="repeat">
+      <a:schemeClr val="lt2"/>
+    </dgm:linClrLst>
+    <dgm:effectClrLst/>
+    <dgm:txLinClrLst/>
+    <dgm:txFillClrLst/>
+    <dgm:txEffectClrLst/>
+  </dgm:styleLbl>
+  <dgm:styleLbl name="asst3">
+    <dgm:fillClrLst meth="repeat">
+      <a:schemeClr val="dk2"/>
+    </dgm:fillClrLst>
+    <dgm:linClrLst meth="repeat">
+      <a:schemeClr val="lt2"/>
+    </dgm:linClrLst>
+    <dgm:effectClrLst/>
+    <dgm:txLinClrLst/>
+    <dgm:txFillClrLst/>
+    <dgm:txEffectClrLst/>
+  </dgm:styleLbl>
+  <dgm:styleLbl name="asst4">
+    <dgm:fillClrLst meth="repeat">
+      <a:schemeClr val="dk2"/>
+    </dgm:fillClrLst>
+    <dgm:linClrLst meth="repeat">
+      <a:schemeClr val="lt2"/>
+    </dgm:linClrLst>
+    <dgm:effectClrLst/>
+    <dgm:txLinClrLst/>
+    <dgm:txFillClrLst/>
+    <dgm:txEffectClrLst/>
+  </dgm:styleLbl>
+  <dgm:styleLbl name="parChTrans2D1">
+    <dgm:fillClrLst meth="repeat">
+      <a:schemeClr val="dk2">
+        <a:tint val="60000"/>
+      </a:schemeClr>
+    </dgm:fillClrLst>
+    <dgm:linClrLst meth="repeat">
+      <a:schemeClr val="dk2">
+        <a:tint val="60000"/>
+      </a:schemeClr>
+    </dgm:linClrLst>
+    <dgm:effectClrLst/>
+    <dgm:txLinClrLst/>
+    <dgm:txFillClrLst meth="repeat">
+      <a:schemeClr val="lt2"/>
+    </dgm:txFillClrLst>
+    <dgm:txEffectClrLst/>
+  </dgm:styleLbl>
+  <dgm:styleLbl name="parChTrans2D2">
+    <dgm:fillClrLst meth="repeat">
+      <a:schemeClr val="dk2"/>
+    </dgm:fillClrLst>
+    <dgm:linClrLst meth="repeat">
+      <a:schemeClr val="dk2"/>
+    </dgm:linClrLst>
+    <dgm:effectClrLst/>
+    <dgm:txLinClrLst/>
+    <dgm:txFillClrLst meth="repeat">
+      <a:schemeClr val="lt2"/>
+    </dgm:txFillClrLst>
+    <dgm:txEffectClrLst/>
+  </dgm:styleLbl>
+  <dgm:styleLbl name="parChTrans2D3">
+    <dgm:fillClrLst meth="repeat">
+      <a:schemeClr val="dk2"/>
+    </dgm:fillClrLst>
+    <dgm:linClrLst meth="repeat">
+      <a:schemeClr val="dk2"/>
+    </dgm:linClrLst>
+    <dgm:effectClrLst/>
+    <dgm:txLinClrLst/>
+    <dgm:txFillClrLst meth="repeat">
+      <a:schemeClr val="lt2"/>
+    </dgm:txFillClrLst>
+    <dgm:txEffectClrLst/>
+  </dgm:styleLbl>
+  <dgm:styleLbl name="parChTrans2D4">
+    <dgm:fillClrLst meth="repeat">
+      <a:schemeClr val="dk2"/>
+    </dgm:fillClrLst>
+    <dgm:linClrLst meth="repeat">
+      <a:schemeClr val="dk2"/>
+    </dgm:linClrLst>
+    <dgm:effectClrLst/>
+    <dgm:txLinClrLst/>
+    <dgm:txFillClrLst meth="repeat">
+      <a:schemeClr val="lt2"/>
+    </dgm:txFillClrLst>
+    <dgm:txEffectClrLst/>
+  </dgm:styleLbl>
+  <dgm:styleLbl name="parChTrans1D1">
+    <dgm:fillClrLst meth="repeat">
+      <a:schemeClr val="dk2"/>
+    </dgm:fillClrLst>
+    <dgm:linClrLst meth="repeat">
+      <a:schemeClr val="dk2">
+        <a:shade val="60000"/>
+      </a:schemeClr>
+    </dgm:linClrLst>
+    <dgm:effectClrLst/>
+    <dgm:txLinClrLst/>
+    <dgm:txFillClrLst meth="repeat">
+      <a:schemeClr val="tx1"/>
+    </dgm:txFillClrLst>
+    <dgm:txEffectClrLst/>
+  </dgm:styleLbl>
+  <dgm:styleLbl name="parChTrans1D2">
+    <dgm:fillClrLst meth="repeat">
+      <a:schemeClr val="dk2"/>
+    </dgm:fillClrLst>
+    <dgm:linClrLst meth="repeat">
+      <a:schemeClr val="dk2">
+        <a:shade val="60000"/>
+      </a:schemeClr>
+    </dgm:linClrLst>
+    <dgm:effectClrLst/>
+    <dgm:txLinClrLst/>
+    <dgm:txFillClrLst meth="repeat">
+      <a:schemeClr val="tx1"/>
+    </dgm:txFillClrLst>
+    <dgm:txEffectClrLst/>
+  </dgm:styleLbl>
+  <dgm:styleLbl name="parChTrans1D3">
+    <dgm:fillClrLst meth="repeat">
+      <a:schemeClr val="dk2"/>
+    </dgm:fillClrLst>
+    <dgm:linClrLst meth="repeat">
+      <a:schemeClr val="dk2">
+        <a:shade val="80000"/>
+      </a:schemeClr>
+    </dgm:linClrLst>
+    <dgm:effectClrLst/>
+    <dgm:txLinClrLst/>
+    <dgm:txFillClrLst meth="repeat">
+      <a:schemeClr val="tx1"/>
+    </dgm:txFillClrLst>
+    <dgm:txEffectClrLst/>
+  </dgm:styleLbl>
+  <dgm:styleLbl name="parChTrans1D4">
+    <dgm:fillClrLst meth="repeat">
+      <a:schemeClr val="dk2"/>
+    </dgm:fillClrLst>
+    <dgm:linClrLst meth="repeat">
+      <a:schemeClr val="dk2">
+        <a:shade val="80000"/>
+      </a:schemeClr>
+    </dgm:linClrLst>
+    <dgm:effectClrLst/>
+    <dgm:txLinClrLst/>
+    <dgm:txFillClrLst meth="repeat">
+      <a:schemeClr val="tx1"/>
+    </dgm:txFillClrLst>
+    <dgm:txEffectClrLst/>
+  </dgm:styleLbl>
+  <dgm:styleLbl name="fgAcc1">
+    <dgm:fillClrLst meth="repeat">
+      <a:schemeClr val="lt2">
+        <a:alpha val="90000"/>
+      </a:schemeClr>
+    </dgm:fillClrLst>
+    <dgm:linClrLst meth="repeat">
+      <a:schemeClr val="dk2"/>
+    </dgm:linClrLst>
+    <dgm:effectClrLst/>
+    <dgm:txLinClrLst/>
+    <dgm:txFillClrLst meth="repeat">
+      <a:schemeClr val="dk1"/>
+    </dgm:txFillClrLst>
+    <dgm:txEffectClrLst/>
+  </dgm:styleLbl>
+  <dgm:styleLbl name="conFgAcc1">
+    <dgm:fillClrLst meth="repeat">
+      <a:schemeClr val="lt2">
+        <a:alpha val="90000"/>
+      </a:schemeClr>
+    </dgm:fillClrLst>
+    <dgm:linClrLst meth="repeat">
+      <a:schemeClr val="dk2"/>
+    </dgm:linClrLst>
+    <dgm:effectClrLst/>
+    <dgm:txLinClrLst/>
+    <dgm:txFillClrLst meth="repeat">
+      <a:schemeClr val="dk1"/>
+    </dgm:txFillClrLst>
+    <dgm:txEffectClrLst/>
+  </dgm:styleLbl>
+  <dgm:styleLbl name="alignAcc1">
+    <dgm:fillClrLst meth="repeat">
+      <a:schemeClr val="lt2">
+        <a:alpha val="90000"/>
+      </a:schemeClr>
+    </dgm:fillClrLst>
+    <dgm:linClrLst meth="repeat">
+      <a:schemeClr val="dk2"/>
+    </dgm:linClrLst>
+    <dgm:effectClrLst/>
+    <dgm:txLinClrLst/>
+    <dgm:txFillClrLst meth="repeat">
+      <a:schemeClr val="dk1"/>
+    </dgm:txFillClrLst>
+    <dgm:txEffectClrLst/>
+  </dgm:styleLbl>
+  <dgm:styleLbl name="trAlignAcc1">
+    <dgm:fillClrLst meth="repeat">
+      <a:schemeClr val="lt2">
+        <a:alpha val="40000"/>
+      </a:schemeClr>
+    </dgm:fillClrLst>
+    <dgm:linClrLst meth="repeat">
+      <a:schemeClr val="dk2"/>
+    </dgm:linClrLst>
+    <dgm:effectClrLst/>
+    <dgm:txLinClrLst/>
+    <dgm:txFillClrLst meth="repeat">
+      <a:schemeClr val="dk1"/>
+    </dgm:txFillClrLst>
+    <dgm:txEffectClrLst/>
+  </dgm:styleLbl>
+  <dgm:styleLbl name="bgAcc1">
+    <dgm:fillClrLst meth="repeat">
+      <a:schemeClr val="lt2">
+        <a:alpha val="90000"/>
+      </a:schemeClr>
+    </dgm:fillClrLst>
+    <dgm:linClrLst meth="repeat">
+      <a:schemeClr val="dk2"/>
+    </dgm:linClrLst>
+    <dgm:effectClrLst/>
+    <dgm:txLinClrLst/>
+    <dgm:txFillClrLst meth="repeat">
+      <a:schemeClr val="dk1"/>
+    </dgm:txFillClrLst>
+    <dgm:txEffectClrLst/>
+  </dgm:styleLbl>
+  <dgm:styleLbl name="solidFgAcc1">
+    <dgm:fillClrLst meth="repeat">
+      <a:schemeClr val="lt2"/>
+    </dgm:fillClrLst>
+    <dgm:linClrLst meth="repeat">
+      <a:schemeClr val="dk2"/>
+    </dgm:linClrLst>
+    <dgm:effectClrLst/>
+    <dgm:txLinClrLst/>
+    <dgm:txFillClrLst meth="repeat">
+      <a:schemeClr val="dk1"/>
+    </dgm:txFillClrLst>
+    <dgm:txEffectClrLst/>
+  </dgm:styleLbl>
+  <dgm:styleLbl name="solidAlignAcc1">
+    <dgm:fillClrLst meth="repeat">
+      <a:schemeClr val="lt2"/>
+    </dgm:fillClrLst>
+    <dgm:linClrLst meth="repeat">
+      <a:schemeClr val="dk2"/>
+    </dgm:linClrLst>
+    <dgm:effectClrLst/>
+    <dgm:txLinClrLst/>
+    <dgm:txFillClrLst meth="repeat">
+      <a:schemeClr val="dk1"/>
+    </dgm:txFillClrLst>
+    <dgm:txEffectClrLst/>
+  </dgm:styleLbl>
+  <dgm:styleLbl name="solidBgAcc1">
+    <dgm:fillClrLst meth="repeat">
+      <a:schemeClr val="lt2"/>
+    </dgm:fillClrLst>
+    <dgm:linClrLst meth="repeat">
+      <a:schemeClr val="dk2"/>
+    </dgm:linClrLst>
+    <dgm:effectClrLst/>
+    <dgm:txLinClrLst/>
+    <dgm:txFillClrLst meth="repeat">
+      <a:schemeClr val="dk1"/>
+    </dgm:txFillClrLst>
+    <dgm:txEffectClrLst/>
+  </dgm:styleLbl>
+  <dgm:styleLbl name="fgAccFollowNode1">
+    <dgm:fillClrLst meth="repeat">
+      <a:schemeClr val="dk2">
+        <a:alpha val="90000"/>
+        <a:tint val="40000"/>
+      </a:schemeClr>
+    </dgm:fillClrLst>
+    <dgm:linClrLst meth="repeat">
+      <a:schemeClr val="dk2">
+        <a:alpha val="90000"/>
+        <a:tint val="40000"/>
+      </a:schemeClr>
+    </dgm:linClrLst>
+    <dgm:effectClrLst/>
+    <dgm:txLinClrLst/>
+    <dgm:txFillClrLst meth="repeat">
+      <a:schemeClr val="dk1"/>
+    </dgm:txFillClrLst>
+    <dgm:txEffectClrLst/>
+  </dgm:styleLbl>
+  <dgm:styleLbl name="alignAccFollowNode1">
+    <dgm:fillClrLst meth="repeat">
+      <a:schemeClr val="dk2">
+        <a:alpha val="90000"/>
+        <a:tint val="40000"/>
+      </a:schemeClr>
+    </dgm:fillClrLst>
+    <dgm:linClrLst meth="repeat">
+      <a:schemeClr val="dk2">
+        <a:alpha val="90000"/>
+        <a:tint val="40000"/>
+      </a:schemeClr>
+    </dgm:linClrLst>
+    <dgm:effectClrLst/>
+    <dgm:txLinClrLst/>
+    <dgm:txFillClrLst meth="repeat">
+      <a:schemeClr val="dk1"/>
+    </dgm:txFillClrLst>
+    <dgm:txEffectClrLst/>
+  </dgm:styleLbl>
+  <dgm:styleLbl name="bgAccFollowNode1">
+    <dgm:fillClrLst meth="repeat">
+      <a:schemeClr val="dk2">
+        <a:alpha val="90000"/>
+        <a:tint val="40000"/>
+      </a:schemeClr>
+    </dgm:fillClrLst>
+    <dgm:linClrLst meth="repeat">
+      <a:schemeClr val="dk2">
+        <a:alpha val="90000"/>
+        <a:tint val="40000"/>
+      </a:schemeClr>
+    </dgm:linClrLst>
+    <dgm:effectClrLst/>
+    <dgm:txLinClrLst/>
+    <dgm:txFillClrLst meth="repeat">
+      <a:schemeClr val="dk1"/>
+    </dgm:txFillClrLst>
+    <dgm:txEffectClrLst/>
+  </dgm:styleLbl>
+  <dgm:styleLbl name="fgAcc0">
+    <dgm:fillClrLst meth="repeat">
+      <a:schemeClr val="lt2">
+        <a:alpha val="90000"/>
+      </a:schemeClr>
+    </dgm:fillClrLst>
+    <dgm:linClrLst meth="repeat">
+      <a:schemeClr val="dk2"/>
+    </dgm:linClrLst>
+    <dgm:effectClrLst/>
+    <dgm:txLinClrLst/>
+    <dgm:txFillClrLst meth="repeat">
+      <a:schemeClr val="dk1"/>
+    </dgm:txFillClrLst>
+    <dgm:txEffectClrLst/>
+  </dgm:styleLbl>
+  <dgm:styleLbl name="fgAcc2">
+    <dgm:fillClrLst meth="repeat">
+      <a:schemeClr val="lt2">
+        <a:alpha val="90000"/>
+      </a:schemeClr>
+    </dgm:fillClrLst>
+    <dgm:linClrLst meth="repeat">
+      <a:schemeClr val="dk2"/>
+    </dgm:linClrLst>
+    <dgm:effectClrLst/>
+    <dgm:txLinClrLst/>
+    <dgm:txFillClrLst meth="repeat">
+      <a:schemeClr val="dk1"/>
+    </dgm:txFillClrLst>
+    <dgm:txEffectClrLst/>
+  </dgm:styleLbl>
+  <dgm:styleLbl name="fgAcc3">
+    <dgm:fillClrLst meth="repeat">
+      <a:schemeClr val="lt2">
+        <a:alpha val="90000"/>
+      </a:schemeClr>
+    </dgm:fillClrLst>
+    <dgm:linClrLst meth="repeat">
+      <a:schemeClr val="dk2"/>
+    </dgm:linClrLst>
+    <dgm:effectClrLst/>
+    <dgm:txLinClrLst/>
+    <dgm:txFillClrLst meth="repeat">
+      <a:schemeClr val="dk1"/>
+    </dgm:txFillClrLst>
+    <dgm:txEffectClrLst/>
+  </dgm:styleLbl>
+  <dgm:styleLbl name="fgAcc4">
+    <dgm:fillClrLst meth="repeat">
+      <a:schemeClr val="lt2">
+        <a:alpha val="90000"/>
+      </a:schemeClr>
+    </dgm:fillClrLst>
+    <dgm:linClrLst meth="repeat">
+      <a:schemeClr val="dk2"/>
+    </dgm:linClrLst>
+    <dgm:effectClrLst/>
+    <dgm:txLinClrLst/>
+    <dgm:txFillClrLst meth="repeat">
+      <a:schemeClr val="dk1"/>
+    </dgm:txFillClrLst>
+    <dgm:txEffectClrLst/>
+  </dgm:styleLbl>
+  <dgm:styleLbl name="bgShp">
+    <dgm:fillClrLst meth="repeat">
+      <a:schemeClr val="dk2">
+        <a:tint val="40000"/>
+      </a:schemeClr>
+    </dgm:fillClrLst>
+    <dgm:linClrLst meth="repeat">
+      <a:schemeClr val="dk2"/>
+    </dgm:linClrLst>
+    <dgm:effectClrLst/>
+    <dgm:txLinClrLst/>
+    <dgm:txFillClrLst meth="repeat">
+      <a:schemeClr val="dk1"/>
+    </dgm:txFillClrLst>
+    <dgm:txEffectClrLst/>
+  </dgm:styleLbl>
+  <dgm:styleLbl name="dkBgShp">
+    <dgm:fillClrLst meth="repeat">
+      <a:schemeClr val="dk2">
+        <a:shade val="80000"/>
+      </a:schemeClr>
+    </dgm:fillClrLst>
+    <dgm:linClrLst meth="repeat">
+      <a:schemeClr val="dk2"/>
+    </dgm:linClrLst>
+    <dgm:effectClrLst/>
+    <dgm:txLinClrLst/>
+    <dgm:txFillClrLst meth="repeat">
+      <a:schemeClr val="lt1"/>
+    </dgm:txFillClrLst>
+    <dgm:txEffectClrLst/>
+  </dgm:styleLbl>
+  <dgm:styleLbl name="trBgShp">
+    <dgm:fillClrLst meth="repeat">
+      <a:schemeClr val="dk2">
+        <a:tint val="50000"/>
+        <a:alpha val="40000"/>
+      </a:schemeClr>
+    </dgm:fillClrLst>
+    <dgm:linClrLst meth="repeat">
+      <a:schemeClr val="dk2"/>
+    </dgm:linClrLst>
+    <dgm:effectClrLst/>
+    <dgm:txLinClrLst/>
+    <dgm:txFillClrLst meth="repeat">
+      <a:schemeClr val="lt1"/>
+    </dgm:txFillClrLst>
+    <dgm:txEffectClrLst/>
+  </dgm:styleLbl>
+  <dgm:styleLbl name="fgShp">
+    <dgm:fillClrLst meth="repeat">
+      <a:schemeClr val="dk2">
+        <a:tint val="60000"/>
+      </a:schemeClr>
+    </dgm:fillClrLst>
+    <dgm:linClrLst meth="repeat">
+      <a:schemeClr val="lt2"/>
+    </dgm:linClrLst>
+    <dgm:effectClrLst/>
+    <dgm:txLinClrLst/>
+    <dgm:txFillClrLst meth="repeat">
+      <a:schemeClr val="dk1"/>
+    </dgm:txFillClrLst>
+    <dgm:txEffectClrLst/>
+  </dgm:styleLbl>
+  <dgm:styleLbl name="revTx">
+    <dgm:fillClrLst meth="repeat">
+      <a:schemeClr val="lt2">
+        <a:alpha val="0"/>
+      </a:schemeClr>
+    </dgm:fillClrLst>
+    <dgm:linClrLst meth="repeat">
+      <a:schemeClr val="dk1">
+        <a:alpha val="0"/>
+      </a:schemeClr>
+    </dgm:linClrLst>
+    <dgm:effectClrLst/>
+    <dgm:txLinClrLst/>
+    <dgm:txFillClrLst meth="repeat">
+      <a:schemeClr val="tx1"/>
+    </dgm:txFillClrLst>
+    <dgm:txEffectClrLst/>
+  </dgm:styleLbl>
+</dgm:colorsDef>
+</file>
+
+<file path=ppt/diagrams/data1.xml><?xml version="1.0" encoding="utf-8"?>
+<dgm:dataModel xmlns:dgm="http://schemas.openxmlformats.org/drawingml/2006/diagram" xmlns:a="http://schemas.openxmlformats.org/drawingml/2006/main">
+  <dgm:ptLst>
+    <dgm:pt modelId="{8BF2B4A2-16C0-4454-A701-C00353AE4052}" type="doc">
+      <dgm:prSet loTypeId="urn:microsoft.com/office/officeart/2005/8/layout/hierarchy1" loCatId="hierarchy" qsTypeId="urn:microsoft.com/office/officeart/2005/8/quickstyle/simple1" qsCatId="simple" csTypeId="urn:microsoft.com/office/officeart/2005/8/colors/accent0_3" csCatId="mainScheme"/>
+      <dgm:spPr/>
+      <dgm:t>
+        <a:bodyPr/>
+        <a:lstStyle/>
+        <a:p>
+          <a:endParaRPr lang="en-US"/>
+        </a:p>
+      </dgm:t>
+    </dgm:pt>
+    <dgm:pt modelId="{8EA36276-56EE-4495-A6A4-4E6091C2AFD2}">
+      <dgm:prSet/>
+      <dgm:spPr/>
+      <dgm:t>
+        <a:bodyPr/>
+        <a:lstStyle/>
+        <a:p>
+          <a:r>
+            <a:rPr lang="fr-FR"/>
+            <a:t>Développement web </a:t>
+          </a:r>
+          <a:endParaRPr lang="en-US"/>
+        </a:p>
+      </dgm:t>
+    </dgm:pt>
+    <dgm:pt modelId="{BBD7CB56-DF04-4CDC-B5A7-AE95C5EB4DE1}" type="parTrans" cxnId="{0B314A39-5896-457F-B280-99A1CAE321CA}">
+      <dgm:prSet/>
+      <dgm:spPr/>
+      <dgm:t>
+        <a:bodyPr/>
+        <a:lstStyle/>
+        <a:p>
+          <a:endParaRPr lang="en-US"/>
+        </a:p>
+      </dgm:t>
+    </dgm:pt>
+    <dgm:pt modelId="{AB10C6FA-5067-447B-AD1D-8ABF7405BAB0}" type="sibTrans" cxnId="{0B314A39-5896-457F-B280-99A1CAE321CA}">
+      <dgm:prSet/>
+      <dgm:spPr/>
+      <dgm:t>
+        <a:bodyPr/>
+        <a:lstStyle/>
+        <a:p>
+          <a:endParaRPr lang="en-US"/>
+        </a:p>
+      </dgm:t>
+    </dgm:pt>
+    <dgm:pt modelId="{0846C06E-2657-43FC-959A-0C2355D87C66}">
+      <dgm:prSet/>
+      <dgm:spPr/>
+      <dgm:t>
+        <a:bodyPr/>
+        <a:lstStyle/>
+        <a:p>
+          <a:r>
+            <a:rPr lang="fr-FR"/>
+            <a:t>Développement sur Arduino </a:t>
+          </a:r>
+          <a:endParaRPr lang="en-US"/>
+        </a:p>
+      </dgm:t>
+    </dgm:pt>
+    <dgm:pt modelId="{00DC344B-495D-43DF-8152-E4D6CA3F78A1}" type="parTrans" cxnId="{39594879-08F7-4522-87A9-D2E3F8C8C78C}">
+      <dgm:prSet/>
+      <dgm:spPr/>
+      <dgm:t>
+        <a:bodyPr/>
+        <a:lstStyle/>
+        <a:p>
+          <a:endParaRPr lang="en-US"/>
+        </a:p>
+      </dgm:t>
+    </dgm:pt>
+    <dgm:pt modelId="{8CBBEC33-3170-4A25-81CD-E4AC157EDB2E}" type="sibTrans" cxnId="{39594879-08F7-4522-87A9-D2E3F8C8C78C}">
+      <dgm:prSet/>
+      <dgm:spPr/>
+      <dgm:t>
+        <a:bodyPr/>
+        <a:lstStyle/>
+        <a:p>
+          <a:endParaRPr lang="en-US"/>
+        </a:p>
+      </dgm:t>
+    </dgm:pt>
+    <dgm:pt modelId="{867C20BB-C98F-4C88-9529-6EF236959518}" type="pres">
+      <dgm:prSet presAssocID="{8BF2B4A2-16C0-4454-A701-C00353AE4052}" presName="hierChild1" presStyleCnt="0">
+        <dgm:presLayoutVars>
+          <dgm:chPref val="1"/>
+          <dgm:dir/>
+          <dgm:animOne val="branch"/>
+          <dgm:animLvl val="lvl"/>
+          <dgm:resizeHandles/>
+        </dgm:presLayoutVars>
+      </dgm:prSet>
+      <dgm:spPr/>
+    </dgm:pt>
+    <dgm:pt modelId="{4346756F-9658-49F5-996D-FD5B29F629C8}" type="pres">
+      <dgm:prSet presAssocID="{8EA36276-56EE-4495-A6A4-4E6091C2AFD2}" presName="hierRoot1" presStyleCnt="0"/>
+      <dgm:spPr/>
+    </dgm:pt>
+    <dgm:pt modelId="{92FF18DA-7F67-48E2-BE5D-9E60418284D1}" type="pres">
+      <dgm:prSet presAssocID="{8EA36276-56EE-4495-A6A4-4E6091C2AFD2}" presName="composite" presStyleCnt="0"/>
+      <dgm:spPr/>
+    </dgm:pt>
+    <dgm:pt modelId="{FF4A64BE-9359-4885-B684-D3DBD5160869}" type="pres">
+      <dgm:prSet presAssocID="{8EA36276-56EE-4495-A6A4-4E6091C2AFD2}" presName="background" presStyleLbl="node0" presStyleIdx="0" presStyleCnt="2"/>
+      <dgm:spPr/>
+    </dgm:pt>
+    <dgm:pt modelId="{B81A3A91-4792-442D-BDDD-62CE37646E21}" type="pres">
+      <dgm:prSet presAssocID="{8EA36276-56EE-4495-A6A4-4E6091C2AFD2}" presName="text" presStyleLbl="fgAcc0" presStyleIdx="0" presStyleCnt="2">
+        <dgm:presLayoutVars>
+          <dgm:chPref val="3"/>
+        </dgm:presLayoutVars>
+      </dgm:prSet>
+      <dgm:spPr/>
+    </dgm:pt>
+    <dgm:pt modelId="{634EC1F1-D3A2-43ED-BA88-D31389FD9351}" type="pres">
+      <dgm:prSet presAssocID="{8EA36276-56EE-4495-A6A4-4E6091C2AFD2}" presName="hierChild2" presStyleCnt="0"/>
+      <dgm:spPr/>
+    </dgm:pt>
+    <dgm:pt modelId="{4F61D06F-CCF5-4DBE-8978-26DE083CBB35}" type="pres">
+      <dgm:prSet presAssocID="{0846C06E-2657-43FC-959A-0C2355D87C66}" presName="hierRoot1" presStyleCnt="0"/>
+      <dgm:spPr/>
+    </dgm:pt>
+    <dgm:pt modelId="{9516FDCC-30F4-41FC-B938-7EC3A5EDA8F2}" type="pres">
+      <dgm:prSet presAssocID="{0846C06E-2657-43FC-959A-0C2355D87C66}" presName="composite" presStyleCnt="0"/>
+      <dgm:spPr/>
+    </dgm:pt>
+    <dgm:pt modelId="{7B13B237-B5DD-4E42-BC9B-9079A41CC6AB}" type="pres">
+      <dgm:prSet presAssocID="{0846C06E-2657-43FC-959A-0C2355D87C66}" presName="background" presStyleLbl="node0" presStyleIdx="1" presStyleCnt="2"/>
+      <dgm:spPr/>
+    </dgm:pt>
+    <dgm:pt modelId="{98717E7A-FD05-481E-9E56-07B61D31BD5B}" type="pres">
+      <dgm:prSet presAssocID="{0846C06E-2657-43FC-959A-0C2355D87C66}" presName="text" presStyleLbl="fgAcc0" presStyleIdx="1" presStyleCnt="2">
+        <dgm:presLayoutVars>
+          <dgm:chPref val="3"/>
+        </dgm:presLayoutVars>
+      </dgm:prSet>
+      <dgm:spPr/>
+    </dgm:pt>
+    <dgm:pt modelId="{51B5AE3A-2D6E-498D-8657-560DFED15522}" type="pres">
+      <dgm:prSet presAssocID="{0846C06E-2657-43FC-959A-0C2355D87C66}" presName="hierChild2" presStyleCnt="0"/>
+      <dgm:spPr/>
+    </dgm:pt>
+  </dgm:ptLst>
+  <dgm:cxnLst>
+    <dgm:cxn modelId="{0B314A39-5896-457F-B280-99A1CAE321CA}" srcId="{8BF2B4A2-16C0-4454-A701-C00353AE4052}" destId="{8EA36276-56EE-4495-A6A4-4E6091C2AFD2}" srcOrd="0" destOrd="0" parTransId="{BBD7CB56-DF04-4CDC-B5A7-AE95C5EB4DE1}" sibTransId="{AB10C6FA-5067-447B-AD1D-8ABF7405BAB0}"/>
+    <dgm:cxn modelId="{EAB17B4F-890E-41AF-89A8-0CBB8419EF15}" type="presOf" srcId="{8BF2B4A2-16C0-4454-A701-C00353AE4052}" destId="{867C20BB-C98F-4C88-9529-6EF236959518}" srcOrd="0" destOrd="0" presId="urn:microsoft.com/office/officeart/2005/8/layout/hierarchy1"/>
+    <dgm:cxn modelId="{4466AB74-2819-4D34-A0D1-5E4FC4644419}" type="presOf" srcId="{0846C06E-2657-43FC-959A-0C2355D87C66}" destId="{98717E7A-FD05-481E-9E56-07B61D31BD5B}" srcOrd="0" destOrd="0" presId="urn:microsoft.com/office/officeart/2005/8/layout/hierarchy1"/>
+    <dgm:cxn modelId="{39594879-08F7-4522-87A9-D2E3F8C8C78C}" srcId="{8BF2B4A2-16C0-4454-A701-C00353AE4052}" destId="{0846C06E-2657-43FC-959A-0C2355D87C66}" srcOrd="1" destOrd="0" parTransId="{00DC344B-495D-43DF-8152-E4D6CA3F78A1}" sibTransId="{8CBBEC33-3170-4A25-81CD-E4AC157EDB2E}"/>
+    <dgm:cxn modelId="{F2FA99C0-4360-4DDA-AE09-109EDC9174F1}" type="presOf" srcId="{8EA36276-56EE-4495-A6A4-4E6091C2AFD2}" destId="{B81A3A91-4792-442D-BDDD-62CE37646E21}" srcOrd="0" destOrd="0" presId="urn:microsoft.com/office/officeart/2005/8/layout/hierarchy1"/>
+    <dgm:cxn modelId="{C1FDBB43-D62E-441B-A72C-7230A3BFAEAB}" type="presParOf" srcId="{867C20BB-C98F-4C88-9529-6EF236959518}" destId="{4346756F-9658-49F5-996D-FD5B29F629C8}" srcOrd="0" destOrd="0" presId="urn:microsoft.com/office/officeart/2005/8/layout/hierarchy1"/>
+    <dgm:cxn modelId="{E5497487-8810-4AF4-9381-8C3D53A4902B}" type="presParOf" srcId="{4346756F-9658-49F5-996D-FD5B29F629C8}" destId="{92FF18DA-7F67-48E2-BE5D-9E60418284D1}" srcOrd="0" destOrd="0" presId="urn:microsoft.com/office/officeart/2005/8/layout/hierarchy1"/>
+    <dgm:cxn modelId="{D3F28836-9043-4300-8D41-70CB974FFF87}" type="presParOf" srcId="{92FF18DA-7F67-48E2-BE5D-9E60418284D1}" destId="{FF4A64BE-9359-4885-B684-D3DBD5160869}" srcOrd="0" destOrd="0" presId="urn:microsoft.com/office/officeart/2005/8/layout/hierarchy1"/>
+    <dgm:cxn modelId="{FEB36AE6-2029-40E9-A190-8445AC9E598F}" type="presParOf" srcId="{92FF18DA-7F67-48E2-BE5D-9E60418284D1}" destId="{B81A3A91-4792-442D-BDDD-62CE37646E21}" srcOrd="1" destOrd="0" presId="urn:microsoft.com/office/officeart/2005/8/layout/hierarchy1"/>
+    <dgm:cxn modelId="{A9CF6E49-8BCD-4B62-A3C1-4684752058F2}" type="presParOf" srcId="{4346756F-9658-49F5-996D-FD5B29F629C8}" destId="{634EC1F1-D3A2-43ED-BA88-D31389FD9351}" srcOrd="1" destOrd="0" presId="urn:microsoft.com/office/officeart/2005/8/layout/hierarchy1"/>
+    <dgm:cxn modelId="{1C233FBC-2046-4A28-B63C-BFD452533614}" type="presParOf" srcId="{867C20BB-C98F-4C88-9529-6EF236959518}" destId="{4F61D06F-CCF5-4DBE-8978-26DE083CBB35}" srcOrd="1" destOrd="0" presId="urn:microsoft.com/office/officeart/2005/8/layout/hierarchy1"/>
+    <dgm:cxn modelId="{1DE52810-352B-4DA9-82A9-A939E1CB1EF0}" type="presParOf" srcId="{4F61D06F-CCF5-4DBE-8978-26DE083CBB35}" destId="{9516FDCC-30F4-41FC-B938-7EC3A5EDA8F2}" srcOrd="0" destOrd="0" presId="urn:microsoft.com/office/officeart/2005/8/layout/hierarchy1"/>
+    <dgm:cxn modelId="{F5B77BFC-63C9-4EE3-B648-ABCE0AF84012}" type="presParOf" srcId="{9516FDCC-30F4-41FC-B938-7EC3A5EDA8F2}" destId="{7B13B237-B5DD-4E42-BC9B-9079A41CC6AB}" srcOrd="0" destOrd="0" presId="urn:microsoft.com/office/officeart/2005/8/layout/hierarchy1"/>
+    <dgm:cxn modelId="{4B523168-7CED-4032-A5A3-1DD2CCFF01F4}" type="presParOf" srcId="{9516FDCC-30F4-41FC-B938-7EC3A5EDA8F2}" destId="{98717E7A-FD05-481E-9E56-07B61D31BD5B}" srcOrd="1" destOrd="0" presId="urn:microsoft.com/office/officeart/2005/8/layout/hierarchy1"/>
+    <dgm:cxn modelId="{BF52AB6B-C400-44A7-96AF-C6B38C24C1F1}" type="presParOf" srcId="{4F61D06F-CCF5-4DBE-8978-26DE083CBB35}" destId="{51B5AE3A-2D6E-498D-8657-560DFED15522}" srcOrd="1" destOrd="0" presId="urn:microsoft.com/office/officeart/2005/8/layout/hierarchy1"/>
+  </dgm:cxnLst>
+  <dgm:bg/>
+  <dgm:whole/>
+  <dgm:extLst>
+    <a:ext uri="http://schemas.microsoft.com/office/drawing/2008/diagram">
+      <dsp:dataModelExt xmlns:dsp="http://schemas.microsoft.com/office/drawing/2008/diagram" relId="rId7" minVer="http://schemas.openxmlformats.org/drawingml/2006/diagram"/>
+    </a:ext>
+  </dgm:extLst>
+</dgm:dataModel>
+</file>
+
+<file path=ppt/diagrams/drawing1.xml><?xml version="1.0" encoding="utf-8"?>
+<dsp:drawing xmlns:dgm="http://schemas.openxmlformats.org/drawingml/2006/diagram" xmlns:dsp="http://schemas.microsoft.com/office/drawing/2008/diagram" xmlns:a="http://schemas.openxmlformats.org/drawingml/2006/main">
+  <dsp:spTree>
+    <dsp:nvGrpSpPr>
+      <dsp:cNvPr id="0" name=""/>
+      <dsp:cNvGrpSpPr/>
+    </dsp:nvGrpSpPr>
+    <dsp:grpSpPr/>
+    <dsp:sp modelId="{FF4A64BE-9359-4885-B684-D3DBD5160869}">
+      <dsp:nvSpPr>
+        <dsp:cNvPr id="0" name=""/>
+        <dsp:cNvSpPr/>
+      </dsp:nvSpPr>
+      <dsp:spPr>
+        <a:xfrm>
+          <a:off x="1049" y="576898"/>
+          <a:ext cx="3683234" cy="2338853"/>
+        </a:xfrm>
+        <a:prstGeom prst="roundRect">
+          <a:avLst>
+            <a:gd name="adj" fmla="val 10000"/>
+          </a:avLst>
+        </a:prstGeom>
+        <a:solidFill>
+          <a:schemeClr val="dk2">
+            <a:hueOff val="0"/>
+            <a:satOff val="0"/>
+            <a:lumOff val="0"/>
+            <a:alphaOff val="0"/>
+          </a:schemeClr>
+        </a:solidFill>
+        <a:ln w="19050" cap="rnd" cmpd="sng" algn="ctr">
+          <a:solidFill>
+            <a:schemeClr val="lt2">
+              <a:hueOff val="0"/>
+              <a:satOff val="0"/>
+              <a:lumOff val="0"/>
+              <a:alphaOff val="0"/>
+            </a:schemeClr>
+          </a:solidFill>
+          <a:prstDash val="solid"/>
+        </a:ln>
+        <a:effectLst/>
+      </dsp:spPr>
+      <dsp:style>
+        <a:lnRef idx="2">
+          <a:scrgbClr r="0" g="0" b="0"/>
+        </a:lnRef>
+        <a:fillRef idx="1">
+          <a:scrgbClr r="0" g="0" b="0"/>
+        </a:fillRef>
+        <a:effectRef idx="0">
+          <a:scrgbClr r="0" g="0" b="0"/>
+        </a:effectRef>
+        <a:fontRef idx="minor">
+          <a:schemeClr val="lt1"/>
+        </a:fontRef>
+      </dsp:style>
+    </dsp:sp>
+    <dsp:sp modelId="{B81A3A91-4792-442D-BDDD-62CE37646E21}">
+      <dsp:nvSpPr>
+        <dsp:cNvPr id="0" name=""/>
+        <dsp:cNvSpPr/>
+      </dsp:nvSpPr>
+      <dsp:spPr>
+        <a:xfrm>
+          <a:off x="410297" y="965684"/>
+          <a:ext cx="3683234" cy="2338853"/>
+        </a:xfrm>
+        <a:prstGeom prst="roundRect">
+          <a:avLst>
+            <a:gd name="adj" fmla="val 10000"/>
+          </a:avLst>
+        </a:prstGeom>
+        <a:solidFill>
+          <a:schemeClr val="lt2">
+            <a:alpha val="90000"/>
+            <a:hueOff val="0"/>
+            <a:satOff val="0"/>
+            <a:lumOff val="0"/>
+            <a:alphaOff val="0"/>
+          </a:schemeClr>
+        </a:solidFill>
+        <a:ln w="19050" cap="rnd" cmpd="sng" algn="ctr">
+          <a:solidFill>
+            <a:schemeClr val="dk2">
+              <a:hueOff val="0"/>
+              <a:satOff val="0"/>
+              <a:lumOff val="0"/>
+              <a:alphaOff val="0"/>
+            </a:schemeClr>
+          </a:solidFill>
+          <a:prstDash val="solid"/>
+        </a:ln>
+        <a:effectLst/>
+      </dsp:spPr>
+      <dsp:style>
+        <a:lnRef idx="2">
+          <a:scrgbClr r="0" g="0" b="0"/>
+        </a:lnRef>
+        <a:fillRef idx="1">
+          <a:scrgbClr r="0" g="0" b="0"/>
+        </a:fillRef>
+        <a:effectRef idx="0">
+          <a:scrgbClr r="0" g="0" b="0"/>
+        </a:effectRef>
+        <a:fontRef idx="minor"/>
+      </dsp:style>
+      <dsp:txBody>
+        <a:bodyPr spcFirstLastPara="0" vert="horz" wrap="square" lIns="137160" tIns="137160" rIns="137160" bIns="137160" numCol="1" spcCol="1270" anchor="ctr" anchorCtr="0">
+          <a:noAutofit/>
+        </a:bodyPr>
+        <a:lstStyle/>
+        <a:p>
+          <a:pPr marL="0" lvl="0" indent="0" algn="ctr" defTabSz="1600200">
+            <a:lnSpc>
+              <a:spcPct val="90000"/>
+            </a:lnSpc>
+            <a:spcBef>
+              <a:spcPct val="0"/>
+            </a:spcBef>
+            <a:spcAft>
+              <a:spcPct val="35000"/>
+            </a:spcAft>
+            <a:buNone/>
+          </a:pPr>
+          <a:r>
+            <a:rPr lang="fr-FR" sz="3600" kern="1200"/>
+            <a:t>Développement web </a:t>
+          </a:r>
+          <a:endParaRPr lang="en-US" sz="3600" kern="1200"/>
+        </a:p>
+      </dsp:txBody>
+      <dsp:txXfrm>
+        <a:off x="478800" y="1034187"/>
+        <a:ext cx="3546228" cy="2201847"/>
+      </dsp:txXfrm>
+    </dsp:sp>
+    <dsp:sp modelId="{7B13B237-B5DD-4E42-BC9B-9079A41CC6AB}">
+      <dsp:nvSpPr>
+        <dsp:cNvPr id="0" name=""/>
+        <dsp:cNvSpPr/>
+      </dsp:nvSpPr>
+      <dsp:spPr>
+        <a:xfrm>
+          <a:off x="4502780" y="576898"/>
+          <a:ext cx="3683234" cy="2338853"/>
+        </a:xfrm>
+        <a:prstGeom prst="roundRect">
+          <a:avLst>
+            <a:gd name="adj" fmla="val 10000"/>
+          </a:avLst>
+        </a:prstGeom>
+        <a:solidFill>
+          <a:schemeClr val="dk2">
+            <a:hueOff val="0"/>
+            <a:satOff val="0"/>
+            <a:lumOff val="0"/>
+            <a:alphaOff val="0"/>
+          </a:schemeClr>
+        </a:solidFill>
+        <a:ln w="19050" cap="rnd" cmpd="sng" algn="ctr">
+          <a:solidFill>
+            <a:schemeClr val="lt2">
+              <a:hueOff val="0"/>
+              <a:satOff val="0"/>
+              <a:lumOff val="0"/>
+              <a:alphaOff val="0"/>
+            </a:schemeClr>
+          </a:solidFill>
+          <a:prstDash val="solid"/>
+        </a:ln>
+        <a:effectLst/>
+      </dsp:spPr>
+      <dsp:style>
+        <a:lnRef idx="2">
+          <a:scrgbClr r="0" g="0" b="0"/>
+        </a:lnRef>
+        <a:fillRef idx="1">
+          <a:scrgbClr r="0" g="0" b="0"/>
+        </a:fillRef>
+        <a:effectRef idx="0">
+          <a:scrgbClr r="0" g="0" b="0"/>
+        </a:effectRef>
+        <a:fontRef idx="minor">
+          <a:schemeClr val="lt1"/>
+        </a:fontRef>
+      </dsp:style>
+    </dsp:sp>
+    <dsp:sp modelId="{98717E7A-FD05-481E-9E56-07B61D31BD5B}">
+      <dsp:nvSpPr>
+        <dsp:cNvPr id="0" name=""/>
+        <dsp:cNvSpPr/>
+      </dsp:nvSpPr>
+      <dsp:spPr>
+        <a:xfrm>
+          <a:off x="4912028" y="965684"/>
+          <a:ext cx="3683234" cy="2338853"/>
+        </a:xfrm>
+        <a:prstGeom prst="roundRect">
+          <a:avLst>
+            <a:gd name="adj" fmla="val 10000"/>
+          </a:avLst>
+        </a:prstGeom>
+        <a:solidFill>
+          <a:schemeClr val="lt2">
+            <a:alpha val="90000"/>
+            <a:hueOff val="0"/>
+            <a:satOff val="0"/>
+            <a:lumOff val="0"/>
+            <a:alphaOff val="0"/>
+          </a:schemeClr>
+        </a:solidFill>
+        <a:ln w="19050" cap="rnd" cmpd="sng" algn="ctr">
+          <a:solidFill>
+            <a:schemeClr val="dk2">
+              <a:hueOff val="0"/>
+              <a:satOff val="0"/>
+              <a:lumOff val="0"/>
+              <a:alphaOff val="0"/>
+            </a:schemeClr>
+          </a:solidFill>
+          <a:prstDash val="solid"/>
+        </a:ln>
+        <a:effectLst/>
+      </dsp:spPr>
+      <dsp:style>
+        <a:lnRef idx="2">
+          <a:scrgbClr r="0" g="0" b="0"/>
+        </a:lnRef>
+        <a:fillRef idx="1">
+          <a:scrgbClr r="0" g="0" b="0"/>
+        </a:fillRef>
+        <a:effectRef idx="0">
+          <a:scrgbClr r="0" g="0" b="0"/>
+        </a:effectRef>
+        <a:fontRef idx="minor"/>
+      </dsp:style>
+      <dsp:txBody>
+        <a:bodyPr spcFirstLastPara="0" vert="horz" wrap="square" lIns="137160" tIns="137160" rIns="137160" bIns="137160" numCol="1" spcCol="1270" anchor="ctr" anchorCtr="0">
+          <a:noAutofit/>
+        </a:bodyPr>
+        <a:lstStyle/>
+        <a:p>
+          <a:pPr marL="0" lvl="0" indent="0" algn="ctr" defTabSz="1600200">
+            <a:lnSpc>
+              <a:spcPct val="90000"/>
+            </a:lnSpc>
+            <a:spcBef>
+              <a:spcPct val="0"/>
+            </a:spcBef>
+            <a:spcAft>
+              <a:spcPct val="35000"/>
+            </a:spcAft>
+            <a:buNone/>
+          </a:pPr>
+          <a:r>
+            <a:rPr lang="fr-FR" sz="3600" kern="1200"/>
+            <a:t>Développement sur Arduino </a:t>
+          </a:r>
+          <a:endParaRPr lang="en-US" sz="3600" kern="1200"/>
+        </a:p>
+      </dsp:txBody>
+      <dsp:txXfrm>
+        <a:off x="4980531" y="1034187"/>
+        <a:ext cx="3546228" cy="2201847"/>
+      </dsp:txXfrm>
+    </dsp:sp>
+  </dsp:spTree>
+</dsp:drawing>
+</file>
+
+<file path=ppt/diagrams/layout1.xml><?xml version="1.0" encoding="utf-8"?>
+<dgm:layoutDef xmlns:dgm="http://schemas.openxmlformats.org/drawingml/2006/diagram" xmlns:a="http://schemas.openxmlformats.org/drawingml/2006/main" uniqueId="urn:microsoft.com/office/officeart/2005/8/layout/hierarchy1">
+  <dgm:title val=""/>
+  <dgm:desc val=""/>
+  <dgm:catLst>
+    <dgm:cat type="hierarchy" pri="2000"/>
+  </dgm:catLst>
+  <dgm:sampData>
+    <dgm:dataModel>
+      <dgm:ptLst>
+        <dgm:pt modelId="0" type="doc"/>
+        <dgm:pt modelId="1">
+          <dgm:prSet phldr="1"/>
+        </dgm:pt>
+        <dgm:pt modelId="2">
+          <dgm:prSet phldr="1"/>
+        </dgm:pt>
+        <dgm:pt modelId="21">
+          <dgm:prSet phldr="1"/>
+        </dgm:pt>
+        <dgm:pt modelId="22">
+          <dgm:prSet phldr="1"/>
+        </dgm:pt>
+        <dgm:pt modelId="3">
+          <dgm:prSet phldr="1"/>
+        </dgm:pt>
+        <dgm:pt modelId="31">
+          <dgm:prSet phldr="1"/>
+        </dgm:pt>
+      </dgm:ptLst>
+      <dgm:cxnLst>
+        <dgm:cxn modelId="4" srcId="0" destId="1" srcOrd="0" destOrd="0"/>
+        <dgm:cxn modelId="5" srcId="1" destId="2" srcOrd="0" destOrd="0"/>
+        <dgm:cxn modelId="6" srcId="1" destId="3" srcOrd="1" destOrd="0"/>
+        <dgm:cxn modelId="23" srcId="2" destId="21" srcOrd="0" destOrd="0"/>
+        <dgm:cxn modelId="24" srcId="2" destId="22" srcOrd="1" destOrd="0"/>
+        <dgm:cxn modelId="33" srcId="3" destId="31" srcOrd="0" destOrd="0"/>
+      </dgm:cxnLst>
+      <dgm:bg/>
+      <dgm:whole/>
+    </dgm:dataModel>
+  </dgm:sampData>
+  <dgm:styleData>
+    <dgm:dataModel>
+      <dgm:ptLst>
+        <dgm:pt modelId="0" type="doc"/>
+        <dgm:pt modelId="1"/>
+        <dgm:pt modelId="11"/>
+        <dgm:pt modelId="12"/>
+      </dgm:ptLst>
+      <dgm:cxnLst>
+        <dgm:cxn modelId="2" srcId="0" destId="1" srcOrd="0" destOrd="0"/>
+        <dgm:cxn modelId="13" srcId="1" destId="11" srcOrd="0" destOrd="0"/>
+        <dgm:cxn modelId="14" srcId="1" destId="12" srcOrd="1" destOrd="0"/>
+      </dgm:cxnLst>
+      <dgm:bg/>
+      <dgm:whole/>
+    </dgm:dataModel>
+  </dgm:styleData>
+  <dgm:clrData>
+    <dgm:dataModel>
+      <dgm:ptLst>
+        <dgm:pt modelId="0" type="doc"/>
+        <dgm:pt modelId="1"/>
+        <dgm:pt modelId="2"/>
+        <dgm:pt modelId="21"/>
+        <dgm:pt modelId="211"/>
+        <dgm:pt modelId="3"/>
+        <dgm:pt modelId="31"/>
+        <dgm:pt modelId="311"/>
+      </dgm:ptLst>
+      <dgm:cxnLst>
+        <dgm:cxn modelId="4" srcId="0" destId="1" srcOrd="0" destOrd="0"/>
+        <dgm:cxn modelId="5" srcId="1" destId="2" srcOrd="0" destOrd="0"/>
+        <dgm:cxn modelId="6" srcId="1" destId="3" srcOrd="1" destOrd="0"/>
+        <dgm:cxn modelId="23" srcId="2" destId="21" srcOrd="0" destOrd="0"/>
+        <dgm:cxn modelId="24" srcId="21" destId="211" srcOrd="0" destOrd="0"/>
+        <dgm:cxn modelId="33" srcId="3" destId="31" srcOrd="0" destOrd="0"/>
+        <dgm:cxn modelId="34" srcId="31" destId="311" srcOrd="0" destOrd="0"/>
+      </dgm:cxnLst>
+      <dgm:bg/>
+      <dgm:whole/>
+    </dgm:dataModel>
+  </dgm:clrData>
+  <dgm:layoutNode name="hierChild1">
+    <dgm:varLst>
+      <dgm:chPref val="1"/>
+      <dgm:dir/>
+      <dgm:animOne val="branch"/>
+      <dgm:animLvl val="lvl"/>
+      <dgm:resizeHandles/>
+    </dgm:varLst>
+    <dgm:choose name="Name0">
+      <dgm:if name="Name1" func="var" arg="dir" op="equ" val="norm">
+        <dgm:alg type="hierChild">
+          <dgm:param type="linDir" val="fromL"/>
+        </dgm:alg>
+      </dgm:if>
+      <dgm:else name="Name2">
+        <dgm:alg type="hierChild">
+          <dgm:param type="linDir" val="fromR"/>
+        </dgm:alg>
+      </dgm:else>
+    </dgm:choose>
+    <dgm:shape xmlns:r="http://schemas.openxmlformats.org/officeDocument/2006/relationships" r:blip="">
+      <dgm:adjLst/>
+    </dgm:shape>
+    <dgm:presOf/>
+    <dgm:constrLst>
+      <dgm:constr type="primFontSz" for="des" ptType="node" op="equ" val="65"/>
+      <dgm:constr type="w" for="des" forName="composite" refType="w"/>
+      <dgm:constr type="h" for="des" forName="composite" refType="w" refFor="des" refForName="composite" fact="0.667"/>
+      <dgm:constr type="w" for="des" forName="composite2" refType="w" refFor="des" refForName="composite"/>
+      <dgm:constr type="h" for="des" forName="composite2" refType="h" refFor="des" refForName="composite"/>
+      <dgm:constr type="w" for="des" forName="composite3" refType="w" refFor="des" refForName="composite"/>
+      <dgm:constr type="h" for="des" forName="composite3" refType="h" refFor="des" refForName="composite"/>
+      <dgm:constr type="w" for="des" forName="composite4" refType="w" refFor="des" refForName="composite"/>
+      <dgm:constr type="h" for="des" forName="composite4" refType="h" refFor="des" refForName="composite"/>
+      <dgm:constr type="w" for="des" forName="composite5" refType="w" refFor="des" refForName="composite"/>
+      <dgm:constr type="h" for="des" forName="composite5" refType="h" refFor="des" refForName="composite"/>
+      <dgm:constr type="sibSp" refType="w" refFor="des" refForName="composite" fact="0.1"/>
+      <dgm:constr type="sibSp" for="des" forName="hierChild2" refType="sibSp"/>
+      <dgm:constr type="sibSp" for="des" forName="hierChild3" refType="sibSp"/>
+      <dgm:constr type="sibSp" for="des" forName="hierChild4" refType="sibSp"/>
+      <dgm:constr type="sibSp" for="des" forName="hierChild5" refType="sibSp"/>
+      <dgm:constr type="sibSp" for="des" forName="hierChild6" refType="sibSp"/>
+      <dgm:constr type="sp" for="des" forName="hierRoot1" refType="h" refFor="des" refForName="composite" fact="0.25"/>
+      <dgm:constr type="sp" for="des" forName="hierRoot2" refType="sp" refFor="des" refForName="hierRoot1"/>
+      <dgm:constr type="sp" for="des" forName="hierRoot3" refType="sp" refFor="des" refForName="hierRoot1"/>
+      <dgm:constr type="sp" for="des" forName="hierRoot4" refType="sp" refFor="des" refForName="hierRoot1"/>
+      <dgm:constr type="sp" for="des" forName="hierRoot5" refType="sp" refFor="des" refForName="hierRoot1"/>
+    </dgm:constrLst>
+    <dgm:ruleLst/>
+    <dgm:forEach name="Name3" axis="ch">
+      <dgm:forEach name="Name4" axis="self" ptType="node">
+        <dgm:layoutNode name="hierRoot1">
+          <dgm:alg type="hierRoot"/>
+          <dgm:shape xmlns:r="http://schemas.openxmlformats.org/officeDocument/2006/relationships" r:blip="">
+            <dgm:adjLst/>
+          </dgm:shape>
+          <dgm:presOf/>
+          <dgm:constrLst>
+            <dgm:constr type="bendDist" for="des" ptType="parTrans" refType="sp" fact="0.5"/>
+          </dgm:constrLst>
+          <dgm:ruleLst/>
+          <dgm:layoutNode name="composite">
+            <dgm:alg type="composite"/>
+            <dgm:shape xmlns:r="http://schemas.openxmlformats.org/officeDocument/2006/relationships" r:blip="">
+              <dgm:adjLst/>
+            </dgm:shape>
+            <dgm:presOf/>
+            <dgm:constrLst>
+              <dgm:constr type="w" for="ch" forName="background" refType="w" fact="0.9"/>
+              <dgm:constr type="h" for="ch" forName="background" refType="w" refFor="ch" refForName="background" fact="0.635"/>
+              <dgm:constr type="t" for="ch" forName="background"/>
+              <dgm:constr type="l" for="ch" forName="background"/>
+              <dgm:constr type="w" for="ch" forName="text" refType="w" fact="0.9"/>
+              <dgm:constr type="h" for="ch" forName="text" refType="w" refFor="ch" refForName="text" fact="0.635"/>
+              <dgm:constr type="t" for="ch" forName="text" refType="w" fact="0.095"/>
+              <dgm:constr type="l" for="ch" forName="text" refType="w" fact="0.1"/>
+            </dgm:constrLst>
+            <dgm:ruleLst/>
+            <dgm:layoutNode name="background" styleLbl="node0" moveWith="text">
+              <dgm:alg type="sp"/>
+              <dgm:shape xmlns:r="http://schemas.openxmlformats.org/officeDocument/2006/relationships" type="roundRect" r:blip="">
+                <dgm:adjLst>
+                  <dgm:adj idx="1" val="0.1"/>
+                </dgm:adjLst>
+              </dgm:shape>
+              <dgm:presOf/>
+              <dgm:constrLst/>
+              <dgm:ruleLst/>
+            </dgm:layoutNode>
+            <dgm:layoutNode name="text" styleLbl="fgAcc0">
+              <dgm:varLst>
+                <dgm:chPref val="3"/>
+              </dgm:varLst>
+              <dgm:alg type="tx"/>
+              <dgm:shape xmlns:r="http://schemas.openxmlformats.org/officeDocument/2006/relationships" type="roundRect" r:blip="">
+                <dgm:adjLst>
+                  <dgm:adj idx="1" val="0.1"/>
+                </dgm:adjLst>
+              </dgm:shape>
+              <dgm:presOf axis="self"/>
+              <dgm:constrLst>
+                <dgm:constr type="tMarg" refType="primFontSz" fact="0.3"/>
+                <dgm:constr type="bMarg" refType="primFontSz" fact="0.3"/>
+                <dgm:constr type="lMarg" refType="primFontSz" fact="0.3"/>
+                <dgm:constr type="rMarg" refType="primFontSz" fact="0.3"/>
+              </dgm:constrLst>
+              <dgm:ruleLst>
+                <dgm:rule type="primFontSz" val="5" fact="NaN" max="NaN"/>
+              </dgm:ruleLst>
+            </dgm:layoutNode>
+          </dgm:layoutNode>
+          <dgm:layoutNode name="hierChild2">
+            <dgm:choose name="Name5">
+              <dgm:if name="Name6" func="var" arg="dir" op="equ" val="norm">
+                <dgm:alg type="hierChild">
+                  <dgm:param type="linDir" val="fromL"/>
+                </dgm:alg>
+              </dgm:if>
+              <dgm:else name="Name7">
+                <dgm:alg type="hierChild">
+                  <dgm:param type="linDir" val="fromR"/>
+                </dgm:alg>
+              </dgm:else>
+            </dgm:choose>
+            <dgm:shape xmlns:r="http://schemas.openxmlformats.org/officeDocument/2006/relationships" r:blip="">
+              <dgm:adjLst/>
+            </dgm:shape>
+            <dgm:presOf/>
+            <dgm:constrLst/>
+            <dgm:ruleLst/>
+            <dgm:forEach name="Name8" axis="ch">
+              <dgm:forEach name="Name9" axis="self" ptType="parTrans" cnt="1">
+                <dgm:layoutNode name="Name10">
+                  <dgm:alg type="conn">
+                    <dgm:param type="dim" val="1D"/>
+                    <dgm:param type="endSty" val="noArr"/>
+                    <dgm:param type="connRout" val="bend"/>
+                    <dgm:param type="bendPt" val="end"/>
+                    <dgm:param type="begPts" val="bCtr"/>
+                    <dgm:param type="endPts" val="tCtr"/>
+                    <dgm:param type="srcNode" val="background"/>
+                    <dgm:param type="dstNode" val="background2"/>
+                  </dgm:alg>
+                  <dgm:shape xmlns:r="http://schemas.openxmlformats.org/officeDocument/2006/relationships" type="conn" r:blip="" zOrderOff="-999">
+                    <dgm:adjLst/>
+                  </dgm:shape>
+                  <dgm:presOf axis="self"/>
+                  <dgm:constrLst>
+                    <dgm:constr type="begPad"/>
+                    <dgm:constr type="endPad"/>
+                  </dgm:constrLst>
+                  <dgm:ruleLst/>
+                </dgm:layoutNode>
+              </dgm:forEach>
+              <dgm:forEach name="Name11" axis="self" ptType="node">
+                <dgm:layoutNode name="hierRoot2">
+                  <dgm:alg type="hierRoot"/>
+                  <dgm:shape xmlns:r="http://schemas.openxmlformats.org/officeDocument/2006/relationships" r:blip="">
+                    <dgm:adjLst/>
+                  </dgm:shape>
+                  <dgm:presOf/>
+                  <dgm:constrLst>
+                    <dgm:constr type="bendDist" for="des" ptType="parTrans" refType="sp" fact="0.5"/>
+                  </dgm:constrLst>
+                  <dgm:ruleLst/>
+                  <dgm:layoutNode name="composite2">
+                    <dgm:alg type="composite"/>
+                    <dgm:shape xmlns:r="http://schemas.openxmlformats.org/officeDocument/2006/relationships" r:blip="">
+                      <dgm:adjLst/>
+                    </dgm:shape>
+                    <dgm:presOf/>
+                    <dgm:constrLst>
+                      <dgm:constr type="w" for="ch" forName="background2" refType="w" fact="0.9"/>
+                      <dgm:constr type="h" for="ch" forName="background2" refType="w" refFor="ch" refForName="background2" fact="0.635"/>
+                      <dgm:constr type="t" for="ch" forName="background2"/>
+                      <dgm:constr type="l" for="ch" forName="background2"/>
+                      <dgm:constr type="w" for="ch" forName="text2" refType="w" fact="0.9"/>
+                      <dgm:constr type="h" for="ch" forName="text2" refType="w" refFor="ch" refForName="text2" fact="0.635"/>
+                      <dgm:constr type="t" for="ch" forName="text2" refType="w" fact="0.095"/>
+                      <dgm:constr type="l" for="ch" forName="text2" refType="w" fact="0.1"/>
+                    </dgm:constrLst>
+                    <dgm:ruleLst/>
+                    <dgm:layoutNode name="background2" moveWith="text2">
+                      <dgm:alg type="sp"/>
+                      <dgm:shape xmlns:r="http://schemas.openxmlformats.org/officeDocument/2006/relationships" type="roundRect" r:blip="">
+                        <dgm:adjLst>
+                          <dgm:adj idx="1" val="0.1"/>
+                        </dgm:adjLst>
+                      </dgm:shape>
+                      <dgm:presOf/>
+                      <dgm:constrLst/>
+                      <dgm:ruleLst/>
+                    </dgm:layoutNode>
+                    <dgm:layoutNode name="text2" styleLbl="fgAcc2">
+                      <dgm:varLst>
+                        <dgm:chPref val="3"/>
+                      </dgm:varLst>
+                      <dgm:alg type="tx"/>
+                      <dgm:shape xmlns:r="http://schemas.openxmlformats.org/officeDocument/2006/relationships" type="roundRect" r:blip="">
+                        <dgm:adjLst>
+                          <dgm:adj idx="1" val="0.1"/>
+                        </dgm:adjLst>
+                      </dgm:shape>
+                      <dgm:presOf axis="self"/>
+                      <dgm:constrLst>
+                        <dgm:constr type="tMarg" refType="primFontSz" fact="0.3"/>
+                        <dgm:constr type="bMarg" refType="primFontSz" fact="0.3"/>
+                        <dgm:constr type="lMarg" refType="primFontSz" fact="0.3"/>
+                        <dgm:constr type="rMarg" refType="primFontSz" fact="0.3"/>
+                      </dgm:constrLst>
+                      <dgm:ruleLst>
+                        <dgm:rule type="primFontSz" val="5" fact="NaN" max="NaN"/>
+                      </dgm:ruleLst>
+                    </dgm:layoutNode>
+                  </dgm:layoutNode>
+                  <dgm:layoutNode name="hierChild3">
+                    <dgm:choose name="Name12">
+                      <dgm:if name="Name13" func="var" arg="dir" op="equ" val="norm">
+                        <dgm:alg type="hierChild">
+                          <dgm:param type="linDir" val="fromL"/>
+                        </dgm:alg>
+                      </dgm:if>
+                      <dgm:else name="Name14">
+                        <dgm:alg type="hierChild">
+                          <dgm:param type="linDir" val="fromR"/>
+                        </dgm:alg>
+                      </dgm:else>
+                    </dgm:choose>
+                    <dgm:shape xmlns:r="http://schemas.openxmlformats.org/officeDocument/2006/relationships" r:blip="">
+                      <dgm:adjLst/>
+                    </dgm:shape>
+                    <dgm:presOf/>
+                    <dgm:constrLst/>
+                    <dgm:ruleLst/>
+                    <dgm:forEach name="Name15" axis="ch">
+                      <dgm:forEach name="Name16" axis="self" ptType="parTrans" cnt="1">
+                        <dgm:layoutNode name="Name17">
+                          <dgm:alg type="conn">
+                            <dgm:param type="dim" val="1D"/>
+                            <dgm:param type="endSty" val="noArr"/>
+                            <dgm:param type="connRout" val="bend"/>
+                            <dgm:param type="bendPt" val="end"/>
+                            <dgm:param type="begPts" val="bCtr"/>
+                            <dgm:param type="endPts" val="tCtr"/>
+                            <dgm:param type="srcNode" val="background2"/>
+                            <dgm:param type="dstNode" val="background3"/>
+                          </dgm:alg>
+                          <dgm:shape xmlns:r="http://schemas.openxmlformats.org/officeDocument/2006/relationships" type="conn" r:blip="" zOrderOff="-999">
+                            <dgm:adjLst/>
+                          </dgm:shape>
+                          <dgm:presOf axis="self"/>
+                          <dgm:constrLst>
+                            <dgm:constr type="begPad"/>
+                            <dgm:constr type="endPad"/>
+                          </dgm:constrLst>
+                          <dgm:ruleLst/>
+                        </dgm:layoutNode>
+                      </dgm:forEach>
+                      <dgm:forEach name="Name18" axis="self" ptType="node">
+                        <dgm:layoutNode name="hierRoot3">
+                          <dgm:alg type="hierRoot"/>
+                          <dgm:shape xmlns:r="http://schemas.openxmlformats.org/officeDocument/2006/relationships" r:blip="">
+                            <dgm:adjLst/>
+                          </dgm:shape>
+                          <dgm:presOf/>
+                          <dgm:constrLst>
+                            <dgm:constr type="bendDist" for="des" ptType="parTrans" refType="sp" fact="0.5"/>
+                          </dgm:constrLst>
+                          <dgm:ruleLst/>
+                          <dgm:layoutNode name="composite3">
+                            <dgm:alg type="composite"/>
+                            <dgm:shape xmlns:r="http://schemas.openxmlformats.org/officeDocument/2006/relationships" r:blip="">
+                              <dgm:adjLst/>
+                            </dgm:shape>
+                            <dgm:presOf/>
+                            <dgm:constrLst>
+                              <dgm:constr type="w" for="ch" forName="background3" refType="w" fact="0.9"/>
+                              <dgm:constr type="h" for="ch" forName="background3" refType="w" refFor="ch" refForName="background3" fact="0.635"/>
+                              <dgm:constr type="t" for="ch" forName="background3"/>
+                              <dgm:constr type="l" for="ch" forName="background3"/>
+                              <dgm:constr type="w" for="ch" forName="text3" refType="w" fact="0.9"/>
+                              <dgm:constr type="h" for="ch" forName="text3" refType="w" refFor="ch" refForName="text3" fact="0.635"/>
+                              <dgm:constr type="t" for="ch" forName="text3" refType="w" fact="0.095"/>
+                              <dgm:constr type="l" for="ch" forName="text3" refType="w" fact="0.1"/>
+                            </dgm:constrLst>
+                            <dgm:ruleLst/>
+                            <dgm:layoutNode name="background3" moveWith="text3">
+                              <dgm:alg type="sp"/>
+                              <dgm:shape xmlns:r="http://schemas.openxmlformats.org/officeDocument/2006/relationships" type="roundRect" r:blip="">
+                                <dgm:adjLst>
+                                  <dgm:adj idx="1" val="0.1"/>
+                                </dgm:adjLst>
+                              </dgm:shape>
+                              <dgm:presOf/>
+                              <dgm:constrLst/>
+                              <dgm:ruleLst/>
+                            </dgm:layoutNode>
+                            <dgm:layoutNode name="text3" styleLbl="fgAcc3">
+                              <dgm:varLst>
+                                <dgm:chPref val="3"/>
+                              </dgm:varLst>
+                              <dgm:alg type="tx"/>
+                              <dgm:shape xmlns:r="http://schemas.openxmlformats.org/officeDocument/2006/relationships" type="roundRect" r:blip="">
+                                <dgm:adjLst>
+                                  <dgm:adj idx="1" val="0.1"/>
+                                </dgm:adjLst>
+                              </dgm:shape>
+                              <dgm:presOf axis="self"/>
+                              <dgm:constrLst>
+                                <dgm:constr type="tMarg" refType="primFontSz" fact="0.3"/>
+                                <dgm:constr type="bMarg" refType="primFontSz" fact="0.3"/>
+                                <dgm:constr type="lMarg" refType="primFontSz" fact="0.3"/>
+                                <dgm:constr type="rMarg" refType="primFontSz" fact="0.3"/>
+                              </dgm:constrLst>
+                              <dgm:ruleLst>
+                                <dgm:rule type="primFontSz" val="5" fact="NaN" max="NaN"/>
+                              </dgm:ruleLst>
+                            </dgm:layoutNode>
+                          </dgm:layoutNode>
+                          <dgm:layoutNode name="hierChild4">
+                            <dgm:choose name="Name19">
+                              <dgm:if name="Name20" func="var" arg="dir" op="equ" val="norm">
+                                <dgm:alg type="hierChild">
+                                  <dgm:param type="linDir" val="fromL"/>
+                                </dgm:alg>
+                              </dgm:if>
+                              <dgm:else name="Name21">
+                                <dgm:alg type="hierChild">
+                                  <dgm:param type="linDir" val="fromR"/>
+                                </dgm:alg>
+                              </dgm:else>
+                            </dgm:choose>
+                            <dgm:shape xmlns:r="http://schemas.openxmlformats.org/officeDocument/2006/relationships" r:blip="">
+                              <dgm:adjLst/>
+                            </dgm:shape>
+                            <dgm:presOf/>
+                            <dgm:constrLst/>
+                            <dgm:ruleLst/>
+                            <dgm:forEach name="repeat" axis="ch">
+                              <dgm:forEach name="Name22" axis="self" ptType="parTrans" cnt="1">
+                                <dgm:layoutNode name="Name23">
+                                  <dgm:choose name="Name24">
+                                    <dgm:if name="Name25" axis="self" func="depth" op="lte" val="4">
+                                      <dgm:alg type="conn">
+                                        <dgm:param type="dim" val="1D"/>
+                                        <dgm:param type="endSty" val="noArr"/>
+                                        <dgm:param type="connRout" val="bend"/>
+                                        <dgm:param type="bendPt" val="end"/>
+                                        <dgm:param type="begPts" val="bCtr"/>
+                                        <dgm:param type="endPts" val="tCtr"/>
+                                        <dgm:param type="srcNode" val="background3"/>
+                                        <dgm:param type="dstNode" val="background4"/>
+                                      </dgm:alg>
+                                    </dgm:if>
+                                    <dgm:else name="Name26">
+                                      <dgm:alg type="conn">
+                                        <dgm:param type="dim" val="1D"/>
+                                        <dgm:param type="endSty" val="noArr"/>
+                                        <dgm:param type="connRout" val="bend"/>
+                                        <dgm:param type="bendPt" val="end"/>
+                                        <dgm:param type="begPts" val="bCtr"/>
+                                        <dgm:param type="endPts" val="tCtr"/>
+                                        <dgm:param type="srcNode" val="background4"/>
+                                        <dgm:param type="dstNode" val="background4"/>
+                                      </dgm:alg>
+                                    </dgm:else>
+                                  </dgm:choose>
+                                  <dgm:shape xmlns:r="http://schemas.openxmlformats.org/officeDocument/2006/relationships" type="conn" r:blip="" zOrderOff="-999">
+                                    <dgm:adjLst/>
+                                  </dgm:shape>
+                                  <dgm:presOf axis="self"/>
+                                  <dgm:constrLst>
+                                    <dgm:constr type="begPad"/>
+                                    <dgm:constr type="endPad"/>
+                                  </dgm:constrLst>
+                                  <dgm:ruleLst/>
+                                </dgm:layoutNode>
+                              </dgm:forEach>
+                              <dgm:forEach name="Name27" axis="self" ptType="node">
+                                <dgm:layoutNode name="hierRoot4">
+                                  <dgm:alg type="hierRoot"/>
+                                  <dgm:shape xmlns:r="http://schemas.openxmlformats.org/officeDocument/2006/relationships" r:blip="">
+                                    <dgm:adjLst/>
+                                  </dgm:shape>
+                                  <dgm:presOf/>
+                                  <dgm:constrLst>
+                                    <dgm:constr type="bendDist" for="des" ptType="parTrans" refType="sp" fact="0.5"/>
+                                  </dgm:constrLst>
+                                  <dgm:ruleLst/>
+                                  <dgm:layoutNode name="composite4">
+                                    <dgm:alg type="composite"/>
+                                    <dgm:shape xmlns:r="http://schemas.openxmlformats.org/officeDocument/2006/relationships" r:blip="">
+                                      <dgm:adjLst/>
+                                    </dgm:shape>
+                                    <dgm:presOf/>
+                                    <dgm:constrLst>
+                                      <dgm:constr type="w" for="ch" forName="background4" refType="w" fact="0.9"/>
+                                      <dgm:constr type="h" for="ch" forName="background4" refType="w" refFor="ch" refForName="background4" fact="0.635"/>
+                                      <dgm:constr type="t" for="ch" forName="background4"/>
+                                      <dgm:constr type="l" for="ch" forName="background4"/>
+                                      <dgm:constr type="w" for="ch" forName="text4" refType="w" fact="0.9"/>
+                                      <dgm:constr type="h" for="ch" forName="text4" refType="w" refFor="ch" refForName="text4" fact="0.635"/>
+                                      <dgm:constr type="t" for="ch" forName="text4" refType="w" fact="0.095"/>
+                                      <dgm:constr type="l" for="ch" forName="text4" refType="w" fact="0.1"/>
+                                    </dgm:constrLst>
+                                    <dgm:ruleLst/>
+                                    <dgm:layoutNode name="background4" moveWith="text4">
+                                      <dgm:alg type="sp"/>
+                                      <dgm:shape xmlns:r="http://schemas.openxmlformats.org/officeDocument/2006/relationships" type="roundRect" r:blip="">
+                                        <dgm:adjLst>
+                                          <dgm:adj idx="1" val="0.1"/>
+                                        </dgm:adjLst>
+                                      </dgm:shape>
+                                      <dgm:presOf/>
+                                      <dgm:constrLst/>
+                                      <dgm:ruleLst/>
+                                    </dgm:layoutNode>
+                                    <dgm:layoutNode name="text4" styleLbl="fgAcc4">
+                                      <dgm:varLst>
+                                        <dgm:chPref val="3"/>
+                                      </dgm:varLst>
+                                      <dgm:alg type="tx"/>
+                                      <dgm:shape xmlns:r="http://schemas.openxmlformats.org/officeDocument/2006/relationships" type="roundRect" r:blip="">
+                                        <dgm:adjLst>
+                                          <dgm:adj idx="1" val="0.1"/>
+                                        </dgm:adjLst>
+                                      </dgm:shape>
+                                      <dgm:presOf axis="self"/>
+                                      <dgm:constrLst>
+                                        <dgm:constr type="tMarg" refType="primFontSz" fact="0.3"/>
+                                        <dgm:constr type="bMarg" refType="primFontSz" fact="0.3"/>
+                                        <dgm:constr type="lMarg" refType="primFontSz" fact="0.3"/>
+                                        <dgm:constr type="rMarg" refType="primFontSz" fact="0.3"/>
+                                      </dgm:constrLst>
+                                      <dgm:ruleLst>
+                                        <dgm:rule type="primFontSz" val="5" fact="NaN" max="NaN"/>
+                                      </dgm:ruleLst>
+                                    </dgm:layoutNode>
+                                  </dgm:layoutNode>
+                                  <dgm:layoutNode name="hierChild5">
+                                    <dgm:choose name="Name28">
+                                      <dgm:if name="Name29" func="var" arg="dir" op="equ" val="norm">
+                                        <dgm:alg type="hierChild">
+                                          <dgm:param type="linDir" val="fromL"/>
+                                        </dgm:alg>
+                                      </dgm:if>
+                                      <dgm:else name="Name30">
+                                        <dgm:alg type="hierChild">
+                                          <dgm:param type="linDir" val="fromR"/>
+                                        </dgm:alg>
+                                      </dgm:else>
+                                    </dgm:choose>
+                                    <dgm:shape xmlns:r="http://schemas.openxmlformats.org/officeDocument/2006/relationships" r:blip="">
+                                      <dgm:adjLst/>
+                                    </dgm:shape>
+                                    <dgm:presOf/>
+                                    <dgm:constrLst/>
+                                    <dgm:ruleLst/>
+                                    <dgm:forEach name="Name31" ref="repeat"/>
+                                  </dgm:layoutNode>
+                                </dgm:layoutNode>
+                              </dgm:forEach>
+                            </dgm:forEach>
+                          </dgm:layoutNode>
+                        </dgm:layoutNode>
+                      </dgm:forEach>
+                    </dgm:forEach>
+                  </dgm:layoutNode>
+                </dgm:layoutNode>
+              </dgm:forEach>
+            </dgm:forEach>
+          </dgm:layoutNode>
+        </dgm:layoutNode>
+      </dgm:forEach>
+    </dgm:forEach>
+  </dgm:layoutNode>
+</dgm:layoutDef>
+</file>
+
+<file path=ppt/diagrams/quickStyle1.xml><?xml version="1.0" encoding="utf-8"?>
+<dgm:styleDef xmlns:dgm="http://schemas.openxmlformats.org/drawingml/2006/diagram" xmlns:a="http://schemas.openxmlformats.org/drawingml/2006/main" uniqueId="urn:microsoft.com/office/officeart/2005/8/quickstyle/simple1">
+  <dgm:title val=""/>
+  <dgm:desc val=""/>
+  <dgm:catLst>
+    <dgm:cat type="simple" pri="10100"/>
+  </dgm:catLst>
+  <dgm:scene3d>
+    <a:camera prst="orthographicFront"/>
+    <a:lightRig rig="threePt" dir="t"/>
+  </dgm:scene3d>
+  <dgm:styleLbl name="node0">
+    <dgm:scene3d>
+      <a:camera prst="orthographicFront"/>
+      <a:lightRig rig="threePt" dir="t"/>
+    </dgm:scene3d>
+    <dgm:sp3d/>
+    <dgm:txPr/>
+    <dgm:style>
+      <a:lnRef idx="2">
+        <a:scrgbClr r="0" g="0" b="0"/>
+      </a:lnRef>
+      <a:fillRef idx="1">
+        <a:scrgbClr r="0" g="0" b="0"/>
+      </a:fillRef>
+      <a:effectRef idx="0">
+        <a:scrgbClr r="0" g="0" b="0"/>
+      </a:effectRef>
+      <a:fontRef idx="minor">
+        <a:schemeClr val="lt1"/>
+      </a:fontRef>
+    </dgm:style>
+  </dgm:styleLbl>
+  <dgm:styleLbl name="lnNode1">
+    <dgm:scene3d>
+      <a:camera prst="orthographicFront"/>
+      <a:lightRig rig="threePt" dir="t"/>
+    </dgm:scene3d>
+    <dgm:sp3d/>
+    <dgm:txPr/>
+    <dgm:style>
+      <a:lnRef idx="2">
+        <a:scrgbClr r="0" g="0" b="0"/>
+      </a:lnRef>
+      <a:fillRef idx="1">
+        <a:scrgbClr r="0" g="0" b="0"/>
+      </a:fillRef>
+      <a:effectRef idx="0">
+        <a:scrgbClr r="0" g="0" b="0"/>
+      </a:effectRef>
+      <a:fontRef idx="minor">
+        <a:schemeClr val="lt1"/>
+      </a:fontRef>
+    </dgm:style>
+  </dgm:styleLbl>
+  <dgm:styleLbl name="vennNode1">
+    <dgm:scene3d>
+      <a:camera prst="orthographicFront"/>
+      <a:lightRig rig="threePt" dir="t"/>
+    </dgm:scene3d>
+    <dgm:sp3d/>
+    <dgm:txPr/>
+    <dgm:style>
+      <a:lnRef idx="2">
+        <a:scrgbClr r="0" g="0" b="0"/>
+      </a:lnRef>
+      <a:fillRef idx="1">
+        <a:scrgbClr r="0" g="0" b="0"/>
+      </a:fillRef>
+      <a:effectRef idx="0">
+        <a:scrgbClr r="0" g="0" b="0"/>
+      </a:effectRef>
+      <a:fontRef idx="minor">
+        <a:schemeClr val="tx1"/>
+      </a:fontRef>
+    </dgm:style>
+  </dgm:styleLbl>
+  <dgm:styleLbl name="alignNode1">
+    <dgm:scene3d>
+      <a:camera prst="orthographicFront"/>
+      <a:lightRig rig="threePt" dir="t"/>
+    </dgm:scene3d>
+    <dgm:sp3d/>
+    <dgm:txPr/>
+    <dgm:style>
+      <a:lnRef idx="2">
+        <a:scrgbClr r="0" g="0" b="0"/>
+      </a:lnRef>
+      <a:fillRef idx="1">
+        <a:scrgbClr r="0" g="0" b="0"/>
+      </a:fillRef>
+      <a:effectRef idx="0">
+        <a:scrgbClr r="0" g="0" b="0"/>
+      </a:effectRef>
+      <a:fontRef idx="minor">
+        <a:schemeClr val="lt1"/>
+      </a:fontRef>
+    </dgm:style>
+  </dgm:styleLbl>
+  <dgm:styleLbl name="node1">
+    <dgm:scene3d>
+      <a:camera prst="orthographicFront"/>
+      <a:lightRig rig="threePt" dir="t"/>
+    </dgm:scene3d>
+    <dgm:sp3d/>
+    <dgm:txPr/>
+    <dgm:style>
+      <a:lnRef idx="2">
+        <a:scrgbClr r="0" g="0" b="0"/>
+      </a:lnRef>
+      <a:fillRef idx="1">
+        <a:scrgbClr r="0" g="0" b="0"/>
+      </a:fillRef>
+      <a:effectRef idx="0">
+        <a:scrgbClr r="0" g="0" b="0"/>
+      </a:effectRef>
+      <a:fontRef idx="minor">
+        <a:schemeClr val="lt1"/>
+      </a:fontRef>
+    </dgm:style>
+  </dgm:styleLbl>
+  <dgm:styleLbl name="node2">
+    <dgm:scene3d>
+      <a:camera prst="orthographicFront"/>
+      <a:lightRig rig="threePt" dir="t"/>
+    </dgm:scene3d>
+    <dgm:sp3d/>
+    <dgm:txPr/>
+    <dgm:style>
+      <a:lnRef idx="2">
+        <a:scrgbClr r="0" g="0" b="0"/>
+      </a:lnRef>
+      <a:fillRef idx="1">
+        <a:scrgbClr r="0" g="0" b="0"/>
+      </a:fillRef>
+      <a:effectRef idx="0">
+        <a:scrgbClr r="0" g="0" b="0"/>
+      </a:effectRef>
+      <a:fontRef idx="minor">
+        <a:schemeClr val="lt1"/>
+      </a:fontRef>
+    </dgm:style>
+  </dgm:styleLbl>
+  <dgm:styleLbl name="node3">
+    <dgm:scene3d>
+      <a:camera prst="orthographicFront"/>
+      <a:lightRig rig="threePt" dir="t"/>
+    </dgm:scene3d>
+    <dgm:sp3d/>
+    <dgm:txPr/>
+    <dgm:style>
+      <a:lnRef idx="2">
+        <a:scrgbClr r="0" g="0" b="0"/>
+      </a:lnRef>
+      <a:fillRef idx="1">
+        <a:scrgbClr r="0" g="0" b="0"/>
+      </a:fillRef>
+      <a:effectRef idx="0">
+        <a:scrgbClr r="0" g="0" b="0"/>
+      </a:effectRef>
+      <a:fontRef idx="minor">
+        <a:schemeClr val="lt1"/>
+      </a:fontRef>
+    </dgm:style>
+  </dgm:styleLbl>
+  <dgm:styleLbl name="node4">
+    <dgm:scene3d>
+      <a:camera prst="orthographicFront"/>
+      <a:lightRig rig="threePt" dir="t"/>
+    </dgm:scene3d>
+    <dgm:sp3d/>
+    <dgm:txPr/>
+    <dgm:style>
+      <a:lnRef idx="2">
+        <a:scrgbClr r="0" g="0" b="0"/>
+      </a:lnRef>
+      <a:fillRef idx="1">
+        <a:scrgbClr r="0" g="0" b="0"/>
+      </a:fillRef>
+      <a:effectRef idx="0">
+        <a:scrgbClr r="0" g="0" b="0"/>
+      </a:effectRef>
+      <a:fontRef idx="minor">
+        <a:schemeClr val="lt1"/>
+      </a:fontRef>
+    </dgm:style>
+  </dgm:styleLbl>
+  <dgm:styleLbl name="fgImgPlace1">
+    <dgm:scene3d>
+      <a:camera prst="orthographicFront"/>
+      <a:lightRig rig="threePt" dir="t"/>
+    </dgm:scene3d>
+    <dgm:sp3d/>
+    <dgm:txPr/>
+    <dgm:style>
+      <a:lnRef idx="2">
+        <a:scrgbClr r="0" g="0" b="0"/>
+      </a:lnRef>
+      <a:fillRef idx="1">
+        <a:scrgbClr r="0" g="0" b="0"/>
+      </a:fillRef>
+      <a:effectRef idx="0">
+        <a:scrgbClr r="0" g="0" b="0"/>
+      </a:effectRef>
+      <a:fontRef idx="minor"/>
+    </dgm:style>
+  </dgm:styleLbl>
+  <dgm:styleLbl name="alignImgPlace1">
+    <dgm:scene3d>
+      <a:camera prst="orthographicFront"/>
+      <a:lightRig rig="threePt" dir="t"/>
+    </dgm:scene3d>
+    <dgm:sp3d/>
+    <dgm:txPr/>
+    <dgm:style>
+      <a:lnRef idx="2">
+        <a:scrgbClr r="0" g="0" b="0"/>
+      </a:lnRef>
+      <a:fillRef idx="1">
+        <a:scrgbClr r="0" g="0" b="0"/>
+      </a:fillRef>
+      <a:effectRef idx="0">
+        <a:scrgbClr r="0" g="0" b="0"/>
+      </a:effectRef>
+      <a:fontRef idx="minor"/>
+    </dgm:style>
+  </dgm:styleLbl>
+  <dgm:styleLbl name="bgImgPlace1">
+    <dgm:scene3d>
+      <a:camera prst="orthographicFront"/>
+      <a:lightRig rig="threePt" dir="t"/>
+    </dgm:scene3d>
+    <dgm:sp3d/>
+    <dgm:txPr/>
+    <dgm:style>
+      <a:lnRef idx="2">
+        <a:scrgbClr r="0" g="0" b="0"/>
+      </a:lnRef>
+      <a:fillRef idx="1">
+        <a:scrgbClr r="0" g="0" b="0"/>
+      </a:fillRef>
+      <a:effectRef idx="0">
+        <a:scrgbClr r="0" g="0" b="0"/>
+      </a:effectRef>
+      <a:fontRef idx="minor"/>
+    </dgm:style>
+  </dgm:styleLbl>
+  <dgm:styleLbl name="sibTrans2D1">
+    <dgm:scene3d>
+      <a:camera prst="orthographicFront"/>
+      <a:lightRig rig="threePt" dir="t"/>
+    </dgm:scene3d>
+    <dgm:sp3d/>
+    <dgm:txPr/>
+    <dgm:style>
+      <a:lnRef idx="0">
+        <a:scrgbClr r="0" g="0" b="0"/>
+      </a:lnRef>
+      <a:fillRef idx="1">
+        <a:scrgbClr r="0" g="0" b="0"/>
+      </a:fillRef>
+      <a:effectRef idx="0">
+        <a:scrgbClr r="0" g="0" b="0"/>
+      </a:effectRef>
+      <a:fontRef idx="minor">
+        <a:schemeClr val="lt1"/>
+      </a:fontRef>
+    </dgm:style>
+  </dgm:styleLbl>
+  <dgm:styleLbl name="fgSibTrans2D1">
+    <dgm:scene3d>
+      <a:camera prst="orthographicFront"/>
+      <a:lightRig rig="threePt" dir="t"/>
+    </dgm:scene3d>
+    <dgm:sp3d/>
+    <dgm:txPr/>
+    <dgm:style>
+      <a:lnRef idx="0">
+        <a:scrgbClr r="0" g="0" b="0"/>
+      </a:lnRef>
+      <a:fillRef idx="1">
+        <a:scrgbClr r="0" g="0" b="0"/>
+      </a:fillRef>
+      <a:effectRef idx="0">
+        <a:scrgbClr r="0" g="0" b="0"/>
+      </a:effectRef>
+      <a:fontRef idx="minor">
+        <a:schemeClr val="lt1"/>
+      </a:fontRef>
+    </dgm:style>
+  </dgm:styleLbl>
+  <dgm:styleLbl name="bgSibTrans2D1">
+    <dgm:scene3d>
+      <a:camera prst="orthographicFront"/>
+      <a:lightRig rig="threePt" dir="t"/>
+    </dgm:scene3d>
+    <dgm:sp3d/>
+    <dgm:txPr/>
+    <dgm:style>
+      <a:lnRef idx="0">
+        <a:scrgbClr r="0" g="0" b="0"/>
+      </a:lnRef>
+      <a:fillRef idx="1">
+        <a:scrgbClr r="0" g="0" b="0"/>
+      </a:fillRef>
+      <a:effectRef idx="0">
+        <a:scrgbClr r="0" g="0" b="0"/>
+      </a:effectRef>
+      <a:fontRef idx="minor">
+        <a:schemeClr val="lt1"/>
+      </a:fontRef>
+    </dgm:style>
+  </dgm:styleLbl>
+  <dgm:styleLbl name="sibTrans1D1">
+    <dgm:scene3d>
+      <a:camera prst="orthographicFront"/>
+      <a:lightRig rig="threePt" dir="t"/>
+    </dgm:scene3d>
+    <dgm:sp3d/>
+    <dgm:txPr/>
+    <dgm:style>
+      <a:lnRef idx="1">
+        <a:scrgbClr r="0" g="0" b="0"/>
+      </a:lnRef>
+      <a:fillRef idx="0">
+        <a:scrgbClr r="0" g="0" b="0"/>
+      </a:fillRef>
+      <a:effectRef idx="0">
+        <a:scrgbClr r="0" g="0" b="0"/>
+      </a:effectRef>
+      <a:fontRef idx="minor"/>
+    </dgm:style>
+  </dgm:styleLbl>
+  <dgm:styleLbl name="callout">
+    <dgm:scene3d>
+      <a:camera prst="orthographicFront"/>
+      <a:lightRig rig="threePt" dir="t"/>
+    </dgm:scene3d>
+    <dgm:sp3d/>
+    <dgm:txPr/>
+    <dgm:style>
+      <a:lnRef idx="2">
+        <a:scrgbClr r="0" g="0" b="0"/>
+      </a:lnRef>
+      <a:fillRef idx="1">
+        <a:scrgbClr r="0" g="0" b="0"/>
+      </a:fillRef>
+      <a:effectRef idx="0">
+        <a:scrgbClr r="0" g="0" b="0"/>
+      </a:effectRef>
+      <a:fontRef idx="minor"/>
+    </dgm:style>
+  </dgm:styleLbl>
+  <dgm:styleLbl name="asst0">
+    <dgm:scene3d>
+      <a:camera prst="orthographicFront"/>
+      <a:lightRig rig="threePt" dir="t"/>
+    </dgm:scene3d>
+    <dgm:sp3d/>
+    <dgm:txPr/>
+    <dgm:style>
+      <a:lnRef idx="2">
+        <a:scrgbClr r="0" g="0" b="0"/>
+      </a:lnRef>
+      <a:fillRef idx="1">
+        <a:scrgbClr r="0" g="0" b="0"/>
+      </a:fillRef>
+      <a:effectRef idx="0">
+        <a:scrgbClr r="0" g="0" b="0"/>
+      </a:effectRef>
+      <a:fontRef idx="minor">
+        <a:schemeClr val="lt1"/>
+      </a:fontRef>
+    </dgm:style>
+  </dgm:styleLbl>
+  <dgm:styleLbl name="asst1">
+    <dgm:scene3d>
+      <a:camera prst="orthographicFront"/>
+      <a:lightRig rig="threePt" dir="t"/>
+    </dgm:scene3d>
+    <dgm:sp3d/>
+    <dgm:txPr/>
+    <dgm:style>
+      <a:lnRef idx="2">
+        <a:scrgbClr r="0" g="0" b="0"/>
+      </a:lnRef>
+      <a:fillRef idx="1">
+        <a:scrgbClr r="0" g="0" b="0"/>
+      </a:fillRef>
+      <a:effectRef idx="0">
+        <a:scrgbClr r="0" g="0" b="0"/>
+      </a:effectRef>
+      <a:fontRef idx="minor">
+        <a:schemeClr val="lt1"/>
+      </a:fontRef>
+    </dgm:style>
+  </dgm:styleLbl>
+  <dgm:styleLbl name="asst2">
+    <dgm:scene3d>
+      <a:camera prst="orthographicFront"/>
+      <a:lightRig rig="threePt" dir="t"/>
+    </dgm:scene3d>
+    <dgm:sp3d/>
+    <dgm:txPr/>
+    <dgm:style>
+      <a:lnRef idx="2">
+        <a:scrgbClr r="0" g="0" b="0"/>
+      </a:lnRef>
+      <a:fillRef idx="1">
+        <a:scrgbClr r="0" g="0" b="0"/>
+      </a:fillRef>
+      <a:effectRef idx="0">
+        <a:scrgbClr r="0" g="0" b="0"/>
+      </a:effectRef>
+      <a:fontRef idx="minor">
+        <a:schemeClr val="lt1"/>
+      </a:fontRef>
+    </dgm:style>
+  </dgm:styleLbl>
+  <dgm:styleLbl name="asst3">
+    <dgm:scene3d>
+      <a:camera prst="orthographicFront"/>
+      <a:lightRig rig="threePt" dir="t"/>
+    </dgm:scene3d>
+    <dgm:sp3d/>
+    <dgm:txPr/>
+    <dgm:style>
+      <a:lnRef idx="2">
+        <a:scrgbClr r="0" g="0" b="0"/>
+      </a:lnRef>
+      <a:fillRef idx="1">
+        <a:scrgbClr r="0" g="0" b="0"/>
+      </a:fillRef>
+      <a:effectRef idx="0">
+        <a:scrgbClr r="0" g="0" b="0"/>
+      </a:effectRef>
+      <a:fontRef idx="minor">
+        <a:schemeClr val="lt1"/>
+      </a:fontRef>
+    </dgm:style>
+  </dgm:styleLbl>
+  <dgm:styleLbl name="asst4">
+    <dgm:scene3d>
+      <a:camera prst="orthographicFront"/>
+      <a:lightRig rig="threePt" dir="t"/>
+    </dgm:scene3d>
+    <dgm:sp3d/>
+    <dgm:txPr/>
+    <dgm:style>
+      <a:lnRef idx="2">
+        <a:scrgbClr r="0" g="0" b="0"/>
+      </a:lnRef>
+      <a:fillRef idx="1">
+        <a:scrgbClr r="0" g="0" b="0"/>
+      </a:fillRef>
+      <a:effectRef idx="0">
+        <a:scrgbClr r="0" g="0" b="0"/>
+      </a:effectRef>
+      <a:fontRef idx="minor">
+        <a:schemeClr val="lt1"/>
+      </a:fontRef>
+    </dgm:style>
+  </dgm:styleLbl>
+  <dgm:styleLbl name="parChTrans2D1">
+    <dgm:scene3d>
+      <a:camera prst="orthographicFront"/>
+      <a:lightRig rig="threePt" dir="t"/>
+    </dgm:scene3d>
+    <dgm:sp3d/>
+    <dgm:txPr/>
+    <dgm:style>
+      <a:lnRef idx="2">
+        <a:scrgbClr r="0" g="0" b="0"/>
+      </a:lnRef>
+      <a:fillRef idx="1">
+        <a:scrgbClr r="0" g="0" b="0"/>
+      </a:fillRef>
+      <a:effectRef idx="0">
+        <a:scrgbClr r="0" g="0" b="0"/>
+      </a:effectRef>
+      <a:fontRef idx="minor">
+        <a:schemeClr val="lt1"/>
+      </a:fontRef>
+    </dgm:style>
+  </dgm:styleLbl>
+  <dgm:styleLbl name="parChTrans2D2">
+    <dgm:scene3d>
+      <a:camera prst="orthographicFront"/>
+      <a:lightRig rig="threePt" dir="t"/>
+    </dgm:scene3d>
+    <dgm:sp3d/>
+    <dgm:txPr/>
+    <dgm:style>
+      <a:lnRef idx="2">
+        <a:scrgbClr r="0" g="0" b="0"/>
+      </a:lnRef>
+      <a:fillRef idx="1">
+        <a:scrgbClr r="0" g="0" b="0"/>
+      </a:fillRef>
+      <a:effectRef idx="0">
+        <a:scrgbClr r="0" g="0" b="0"/>
+      </a:effectRef>
+      <a:fontRef idx="minor">
+        <a:schemeClr val="lt1"/>
+      </a:fontRef>
+    </dgm:style>
+  </dgm:styleLbl>
+  <dgm:styleLbl name="parChTrans2D3">
+    <dgm:scene3d>
+      <a:camera prst="orthographicFront"/>
+      <a:lightRig rig="threePt" dir="t"/>
+    </dgm:scene3d>
+    <dgm:sp3d/>
+    <dgm:txPr/>
+    <dgm:style>
+      <a:lnRef idx="2">
+        <a:scrgbClr r="0" g="0" b="0"/>
+      </a:lnRef>
+      <a:fillRef idx="1">
+        <a:scrgbClr r="0" g="0" b="0"/>
+      </a:fillRef>
+      <a:effectRef idx="0">
+        <a:scrgbClr r="0" g="0" b="0"/>
+      </a:effectRef>
+      <a:fontRef idx="minor">
+        <a:schemeClr val="lt1"/>
+      </a:fontRef>
+    </dgm:style>
+  </dgm:styleLbl>
+  <dgm:styleLbl name="parChTrans2D4">
+    <dgm:scene3d>
+      <a:camera prst="orthographicFront"/>
+      <a:lightRig rig="threePt" dir="t"/>
+    </dgm:scene3d>
+    <dgm:sp3d/>
+    <dgm:txPr/>
+    <dgm:style>
+      <a:lnRef idx="2">
+        <a:scrgbClr r="0" g="0" b="0"/>
+      </a:lnRef>
+      <a:fillRef idx="1">
+        <a:scrgbClr r="0" g="0" b="0"/>
+      </a:fillRef>
+      <a:effectRef idx="0">
+        <a:scrgbClr r="0" g="0" b="0"/>
+      </a:effectRef>
+      <a:fontRef idx="minor">
+        <a:schemeClr val="lt1"/>
+      </a:fontRef>
+    </dgm:style>
+  </dgm:styleLbl>
+  <dgm:styleLbl name="parChTrans1D1">
+    <dgm:scene3d>
+      <a:camera prst="orthographicFront"/>
+      <a:lightRig rig="threePt" dir="t"/>
+    </dgm:scene3d>
+    <dgm:sp3d/>
+    <dgm:txPr/>
+    <dgm:style>
+      <a:lnRef idx="2">
+        <a:scrgbClr r="0" g="0" b="0"/>
+      </a:lnRef>
+      <a:fillRef idx="0">
+        <a:scrgbClr r="0" g="0" b="0"/>
+      </a:fillRef>
+      <a:effectRef idx="0">
+        <a:scrgbClr r="0" g="0" b="0"/>
+      </a:effectRef>
+      <a:fontRef idx="minor"/>
+    </dgm:style>
+  </dgm:styleLbl>
+  <dgm:styleLbl name="parChTrans1D2">
+    <dgm:scene3d>
+      <a:camera prst="orthographicFront"/>
+      <a:lightRig rig="threePt" dir="t"/>
+    </dgm:scene3d>
+    <dgm:sp3d/>
+    <dgm:txPr/>
+    <dgm:style>
+      <a:lnRef idx="2">
+        <a:scrgbClr r="0" g="0" b="0"/>
+      </a:lnRef>
+      <a:fillRef idx="0">
+        <a:scrgbClr r="0" g="0" b="0"/>
+      </a:fillRef>
+      <a:effectRef idx="0">
+        <a:scrgbClr r="0" g="0" b="0"/>
+      </a:effectRef>
+      <a:fontRef idx="minor"/>
+    </dgm:style>
+  </dgm:styleLbl>
+  <dgm:styleLbl name="parChTrans1D3">
+    <dgm:scene3d>
+      <a:camera prst="orthographicFront"/>
+      <a:lightRig rig="threePt" dir="t"/>
+    </dgm:scene3d>
+    <dgm:sp3d/>
+    <dgm:txPr/>
+    <dgm:style>
+      <a:lnRef idx="2">
+        <a:scrgbClr r="0" g="0" b="0"/>
+      </a:lnRef>
+      <a:fillRef idx="0">
+        <a:scrgbClr r="0" g="0" b="0"/>
+      </a:fillRef>
+      <a:effectRef idx="0">
+        <a:scrgbClr r="0" g="0" b="0"/>
+      </a:effectRef>
+      <a:fontRef idx="minor"/>
+    </dgm:style>
+  </dgm:styleLbl>
+  <dgm:styleLbl name="parChTrans1D4">
+    <dgm:scene3d>
+      <a:camera prst="orthographicFront"/>
+      <a:lightRig rig="threePt" dir="t"/>
+    </dgm:scene3d>
+    <dgm:sp3d/>
+    <dgm:txPr/>
+    <dgm:style>
+      <a:lnRef idx="2">
+        <a:scrgbClr r="0" g="0" b="0"/>
+      </a:lnRef>
+      <a:fillRef idx="0">
+        <a:scrgbClr r="0" g="0" b="0"/>
+      </a:fillRef>
+      <a:effectRef idx="0">
+        <a:scrgbClr r="0" g="0" b="0"/>
+      </a:effectRef>
+      <a:fontRef idx="minor"/>
+    </dgm:style>
+  </dgm:styleLbl>
+  <dgm:styleLbl name="fgAcc1">
+    <dgm:scene3d>
+      <a:camera prst="orthographicFront"/>
+      <a:lightRig rig="threePt" dir="t"/>
+    </dgm:scene3d>
+    <dgm:sp3d/>
+    <dgm:txPr/>
+    <dgm:style>
+      <a:lnRef idx="2">
+        <a:scrgbClr r="0" g="0" b="0"/>
+      </a:lnRef>
+      <a:fillRef idx="1">
+        <a:scrgbClr r="0" g="0" b="0"/>
+      </a:fillRef>
+      <a:effectRef idx="0">
+        <a:scrgbClr r="0" g="0" b="0"/>
+      </a:effectRef>
+      <a:fontRef idx="minor"/>
+    </dgm:style>
+  </dgm:styleLbl>
+  <dgm:styleLbl name="conFgAcc1">
+    <dgm:scene3d>
+      <a:camera prst="orthographicFront"/>
+      <a:lightRig rig="threePt" dir="t"/>
+    </dgm:scene3d>
+    <dgm:sp3d/>
+    <dgm:txPr/>
+    <dgm:style>
+      <a:lnRef idx="2">
+        <a:scrgbClr r="0" g="0" b="0"/>
+      </a:lnRef>
+      <a:fillRef idx="1">
+        <a:scrgbClr r="0" g="0" b="0"/>
+      </a:fillRef>
+      <a:effectRef idx="0">
+        <a:scrgbClr r="0" g="0" b="0"/>
+      </a:effectRef>
+      <a:fontRef idx="minor"/>
+    </dgm:style>
+  </dgm:styleLbl>
+  <dgm:styleLbl name="alignAcc1">
+    <dgm:scene3d>
+      <a:camera prst="orthographicFront"/>
+      <a:lightRig rig="threePt" dir="t"/>
+    </dgm:scene3d>
+    <dgm:sp3d/>
+    <dgm:txPr/>
+    <dgm:style>
+      <a:lnRef idx="2">
+        <a:scrgbClr r="0" g="0" b="0"/>
+      </a:lnRef>
+      <a:fillRef idx="1">
+        <a:scrgbClr r="0" g="0" b="0"/>
+      </a:fillRef>
+      <a:effectRef idx="0">
+        <a:scrgbClr r="0" g="0" b="0"/>
+      </a:effectRef>
+      <a:fontRef idx="minor"/>
+    </dgm:style>
+  </dgm:styleLbl>
+  <dgm:styleLbl name="trAlignAcc1">
+    <dgm:scene3d>
+      <a:camera prst="orthographicFront"/>
+      <a:lightRig rig="threePt" dir="t"/>
+    </dgm:scene3d>
+    <dgm:sp3d/>
+    <dgm:txPr/>
+    <dgm:style>
+      <a:lnRef idx="1">
+        <a:scrgbClr r="0" g="0" b="0"/>
+      </a:lnRef>
+      <a:fillRef idx="1">
+        <a:scrgbClr r="0" g="0" b="0"/>
+      </a:fillRef>
+      <a:effectRef idx="0">
+        <a:scrgbClr r="0" g="0" b="0"/>
+      </a:effectRef>
+      <a:fontRef idx="minor"/>
+    </dgm:style>
+  </dgm:styleLbl>
+  <dgm:styleLbl name="bgAcc1">
+    <dgm:scene3d>
+      <a:camera prst="orthographicFront"/>
+      <a:lightRig rig="threePt" dir="t"/>
+    </dgm:scene3d>
+    <dgm:sp3d/>
+    <dgm:txPr/>
+    <dgm:style>
+      <a:lnRef idx="2">
+        <a:scrgbClr r="0" g="0" b="0"/>
+      </a:lnRef>
+      <a:fillRef idx="1">
+        <a:scrgbClr r="0" g="0" b="0"/>
+      </a:fillRef>
+      <a:effectRef idx="0">
+        <a:scrgbClr r="0" g="0" b="0"/>
+      </a:effectRef>
+      <a:fontRef idx="minor"/>
+    </dgm:style>
+  </dgm:styleLbl>
+  <dgm:styleLbl name="solidFgAcc1">
+    <dgm:scene3d>
+      <a:camera prst="orthographicFront"/>
+      <a:lightRig rig="threePt" dir="t"/>
+    </dgm:scene3d>
+    <dgm:sp3d/>
+    <dgm:txPr/>
+    <dgm:style>
+      <a:lnRef idx="2">
+        <a:scrgbClr r="0" g="0" b="0"/>
+      </a:lnRef>
+      <a:fillRef idx="1">
+        <a:scrgbClr r="0" g="0" b="0"/>
+      </a:fillRef>
+      <a:effectRef idx="0">
+        <a:scrgbClr r="0" g="0" b="0"/>
+      </a:effectRef>
+      <a:fontRef idx="minor"/>
+    </dgm:style>
+  </dgm:styleLbl>
+  <dgm:styleLbl name="solidAlignAcc1">
+    <dgm:scene3d>
+      <a:camera prst="orthographicFront"/>
+      <a:lightRig rig="threePt" dir="t"/>
+    </dgm:scene3d>
+    <dgm:sp3d/>
+    <dgm:txPr/>
+    <dgm:style>
+      <a:lnRef idx="2">
+        <a:scrgbClr r="0" g="0" b="0"/>
+      </a:lnRef>
+      <a:fillRef idx="1">
+        <a:scrgbClr r="0" g="0" b="0"/>
+      </a:fillRef>
+      <a:effectRef idx="0">
+        <a:scrgbClr r="0" g="0" b="0"/>
+      </a:effectRef>
+      <a:fontRef idx="minor"/>
+    </dgm:style>
+  </dgm:styleLbl>
+  <dgm:styleLbl name="solidBgAcc1">
+    <dgm:scene3d>
+      <a:camera prst="orthographicFront"/>
+      <a:lightRig rig="threePt" dir="t"/>
+    </dgm:scene3d>
+    <dgm:sp3d/>
+    <dgm:txPr/>
+    <dgm:style>
+      <a:lnRef idx="2">
+        <a:scrgbClr r="0" g="0" b="0"/>
+      </a:lnRef>
+      <a:fillRef idx="1">
+        <a:scrgbClr r="0" g="0" b="0"/>
+      </a:fillRef>
+      <a:effectRef idx="0">
+        <a:scrgbClr r="0" g="0" b="0"/>
+      </a:effectRef>
+      <a:fontRef idx="minor"/>
+    </dgm:style>
+  </dgm:styleLbl>
+  <dgm:styleLbl name="fgAccFollowNode1">
+    <dgm:scene3d>
+      <a:camera prst="orthographicFront"/>
+      <a:lightRig rig="threePt" dir="t"/>
+    </dgm:scene3d>
+    <dgm:sp3d/>
+    <dgm:txPr/>
+    <dgm:style>
+      <a:lnRef idx="2">
+        <a:scrgbClr r="0" g="0" b="0"/>
+      </a:lnRef>
+      <a:fillRef idx="1">
+        <a:scrgbClr r="0" g="0" b="0"/>
+      </a:fillRef>
+      <a:effectRef idx="0">
+        <a:scrgbClr r="0" g="0" b="0"/>
+      </a:effectRef>
+      <a:fontRef idx="minor"/>
+    </dgm:style>
+  </dgm:styleLbl>
+  <dgm:styleLbl name="alignAccFollowNode1">
+    <dgm:scene3d>
+      <a:camera prst="orthographicFront"/>
+      <a:lightRig rig="threePt" dir="t"/>
+    </dgm:scene3d>
+    <dgm:sp3d/>
+    <dgm:txPr/>
+    <dgm:style>
+      <a:lnRef idx="2">
+        <a:scrgbClr r="0" g="0" b="0"/>
+      </a:lnRef>
+      <a:fillRef idx="1">
+        <a:scrgbClr r="0" g="0" b="0"/>
+      </a:fillRef>
+      <a:effectRef idx="0">
+        <a:scrgbClr r="0" g="0" b="0"/>
+      </a:effectRef>
+      <a:fontRef idx="minor"/>
+    </dgm:style>
+  </dgm:styleLbl>
+  <dgm:styleLbl name="bgAccFollowNode1">
+    <dgm:scene3d>
+      <a:camera prst="orthographicFront"/>
+      <a:lightRig rig="threePt" dir="t"/>
+    </dgm:scene3d>
+    <dgm:sp3d/>
+    <dgm:txPr/>
+    <dgm:style>
+      <a:lnRef idx="2">
+        <a:scrgbClr r="0" g="0" b="0"/>
+      </a:lnRef>
+      <a:fillRef idx="1">
+        <a:scrgbClr r="0" g="0" b="0"/>
+      </a:fillRef>
+      <a:effectRef idx="0">
+        <a:scrgbClr r="0" g="0" b="0"/>
+      </a:effectRef>
+      <a:fontRef idx="minor"/>
+    </dgm:style>
+  </dgm:styleLbl>
+  <dgm:styleLbl name="fgAcc0">
+    <dgm:scene3d>
+      <a:camera prst="orthographicFront"/>
+      <a:lightRig rig="threePt" dir="t"/>
+    </dgm:scene3d>
+    <dgm:sp3d/>
+    <dgm:txPr/>
+    <dgm:style>
+      <a:lnRef idx="2">
+        <a:scrgbClr r="0" g="0" b="0"/>
+      </a:lnRef>
+      <a:fillRef idx="1">
+        <a:scrgbClr r="0" g="0" b="0"/>
+      </a:fillRef>
+      <a:effectRef idx="0">
+        <a:scrgbClr r="0" g="0" b="0"/>
+      </a:effectRef>
+      <a:fontRef idx="minor"/>
+    </dgm:style>
+  </dgm:styleLbl>
+  <dgm:styleLbl name="fgAcc2">
+    <dgm:scene3d>
+      <a:camera prst="orthographicFront"/>
+      <a:lightRig rig="threePt" dir="t"/>
+    </dgm:scene3d>
+    <dgm:sp3d/>
+    <dgm:txPr/>
+    <dgm:style>
+      <a:lnRef idx="2">
+        <a:scrgbClr r="0" g="0" b="0"/>
+      </a:lnRef>
+      <a:fillRef idx="1">
+        <a:scrgbClr r="0" g="0" b="0"/>
+      </a:fillRef>
+      <a:effectRef idx="0">
+        <a:scrgbClr r="0" g="0" b="0"/>
+      </a:effectRef>
+      <a:fontRef idx="minor"/>
+    </dgm:style>
+  </dgm:styleLbl>
+  <dgm:styleLbl name="fgAcc3">
+    <dgm:scene3d>
+      <a:camera prst="orthographicFront"/>
+      <a:lightRig rig="threePt" dir="t"/>
+    </dgm:scene3d>
+    <dgm:sp3d/>
+    <dgm:txPr/>
+    <dgm:style>
+      <a:lnRef idx="2">
+        <a:scrgbClr r="0" g="0" b="0"/>
+      </a:lnRef>
+      <a:fillRef idx="1">
+        <a:scrgbClr r="0" g="0" b="0"/>
+      </a:fillRef>
+      <a:effectRef idx="0">
+        <a:scrgbClr r="0" g="0" b="0"/>
+      </a:effectRef>
+      <a:fontRef idx="minor"/>
+    </dgm:style>
+  </dgm:styleLbl>
+  <dgm:styleLbl name="fgAcc4">
+    <dgm:scene3d>
+      <a:camera prst="orthographicFront"/>
+      <a:lightRig rig="threePt" dir="t"/>
+    </dgm:scene3d>
+    <dgm:sp3d/>
+    <dgm:txPr/>
+    <dgm:style>
+      <a:lnRef idx="2">
+        <a:scrgbClr r="0" g="0" b="0"/>
+      </a:lnRef>
+      <a:fillRef idx="1">
+        <a:scrgbClr r="0" g="0" b="0"/>
+      </a:fillRef>
+      <a:effectRef idx="0">
+        <a:scrgbClr r="0" g="0" b="0"/>
+      </a:effectRef>
+      <a:fontRef idx="minor"/>
+    </dgm:style>
+  </dgm:styleLbl>
+  <dgm:styleLbl name="bgShp">
+    <dgm:scene3d>
+      <a:camera prst="orthographicFront"/>
+      <a:lightRig rig="threePt" dir="t"/>
+    </dgm:scene3d>
+    <dgm:sp3d/>
+    <dgm:txPr/>
+    <dgm:style>
+      <a:lnRef idx="0">
+        <a:scrgbClr r="0" g="0" b="0"/>
+      </a:lnRef>
+      <a:fillRef idx="1">
+        <a:scrgbClr r="0" g="0" b="0"/>
+      </a:fillRef>
+      <a:effectRef idx="0">
+        <a:scrgbClr r="0" g="0" b="0"/>
+      </a:effectRef>
+      <a:fontRef idx="minor"/>
+    </dgm:style>
+  </dgm:styleLbl>
+  <dgm:styleLbl name="dkBgShp">
+    <dgm:scene3d>
+      <a:camera prst="orthographicFront"/>
+      <a:lightRig rig="threePt" dir="t"/>
+    </dgm:scene3d>
+    <dgm:sp3d/>
+    <dgm:txPr/>
+    <dgm:style>
+      <a:lnRef idx="0">
+        <a:scrgbClr r="0" g="0" b="0"/>
+      </a:lnRef>
+      <a:fillRef idx="1">
+        <a:scrgbClr r="0" g="0" b="0"/>
+      </a:fillRef>
+      <a:effectRef idx="0">
+        <a:scrgbClr r="0" g="0" b="0"/>
+      </a:effectRef>
+      <a:fontRef idx="minor"/>
+    </dgm:style>
+  </dgm:styleLbl>
+  <dgm:styleLbl name="trBgShp">
+    <dgm:scene3d>
+      <a:camera prst="orthographicFront"/>
+      <a:lightRig rig="threePt" dir="t"/>
+    </dgm:scene3d>
+    <dgm:sp3d/>
+    <dgm:txPr/>
+    <dgm:style>
+      <a:lnRef idx="0">
+        <a:scrgbClr r="0" g="0" b="0"/>
+      </a:lnRef>
+      <a:fillRef idx="1">
+        <a:scrgbClr r="0" g="0" b="0"/>
+      </a:fillRef>
+      <a:effectRef idx="0">
+        <a:scrgbClr r="0" g="0" b="0"/>
+      </a:effectRef>
+      <a:fontRef idx="minor"/>
+    </dgm:style>
+  </dgm:styleLbl>
+  <dgm:styleLbl name="fgShp">
+    <dgm:scene3d>
+      <a:camera prst="orthographicFront"/>
+      <a:lightRig rig="threePt" dir="t"/>
+    </dgm:scene3d>
+    <dgm:sp3d/>
+    <dgm:txPr/>
+    <dgm:style>
+      <a:lnRef idx="2">
+        <a:scrgbClr r="0" g="0" b="0"/>
+      </a:lnRef>
+      <a:fillRef idx="1">
+        <a:scrgbClr r="0" g="0" b="0"/>
+      </a:fillRef>
+      <a:effectRef idx="0">
+        <a:scrgbClr r="0" g="0" b="0"/>
+      </a:effectRef>
+      <a:fontRef idx="minor"/>
+    </dgm:style>
+  </dgm:styleLbl>
+  <dgm:styleLbl name="revTx">
+    <dgm:scene3d>
+      <a:camera prst="orthographicFront"/>
+      <a:lightRig rig="threePt" dir="t"/>
+    </dgm:scene3d>
+    <dgm:sp3d/>
+    <dgm:txPr/>
+    <dgm:style>
+      <a:lnRef idx="0">
+        <a:scrgbClr r="0" g="0" b="0"/>
+      </a:lnRef>
+      <a:fillRef idx="0">
+        <a:scrgbClr r="0" g="0" b="0"/>
+      </a:fillRef>
+      <a:effectRef idx="0">
+        <a:scrgbClr r="0" g="0" b="0"/>
+      </a:effectRef>
+      <a:fontRef idx="minor"/>
+    </dgm:style>
+  </dgm:styleLbl>
+</dgm:styleDef>
 </file>
 
 <file path=ppt/slideLayouts/slideLayout1.xml><?xml version="1.0" encoding="utf-8"?>
@@ -6922,9 +9718,16 @@
             <p:ph type="title"/>
           </p:nvPr>
         </p:nvSpPr>
-        <p:spPr/>
+        <p:spPr>
+          <a:xfrm>
+            <a:off x="367304" y="799292"/>
+            <a:ext cx="4890164" cy="728546"/>
+          </a:xfrm>
+        </p:spPr>
         <p:txBody>
-          <a:bodyPr/>
+          <a:bodyPr>
+            <a:normAutofit fontScale="90000"/>
+          </a:bodyPr>
           <a:lstStyle/>
           <a:p>
             <a:r>
@@ -7535,6 +10338,51 @@
           </a:prstGeom>
         </p:spPr>
       </p:pic>
+      <p:pic>
+        <p:nvPicPr>
+          <p:cNvPr id="8" name="Picture 2" descr="Image associée">
+            <a:extLst>
+              <a:ext uri="{FF2B5EF4-FFF2-40B4-BE49-F238E27FC236}">
+                <a16:creationId xmlns:a16="http://schemas.microsoft.com/office/drawing/2014/main" id="{1D2A2ED6-3334-446B-B7F9-4AEDA8226A7B}"/>
+              </a:ext>
+            </a:extLst>
+          </p:cNvPr>
+          <p:cNvPicPr>
+            <a:picLocks noChangeAspect="1" noChangeArrowheads="1"/>
+          </p:cNvPicPr>
+          <p:nvPr/>
+        </p:nvPicPr>
+        <p:blipFill rotWithShape="1">
+          <a:blip r:embed="rId4">
+            <a:extLst>
+              <a:ext uri="{28A0092B-C50C-407E-A947-70E740481C1C}">
+                <a14:useLocalDpi xmlns:a14="http://schemas.microsoft.com/office/drawing/2010/main" val="0"/>
+              </a:ext>
+            </a:extLst>
+          </a:blip>
+          <a:srcRect l="18677" r="15441"/>
+          <a:stretch/>
+        </p:blipFill>
+        <p:spPr bwMode="auto">
+          <a:xfrm>
+            <a:off x="143436" y="143435"/>
+            <a:ext cx="2269635" cy="609600"/>
+          </a:xfrm>
+          <a:prstGeom prst="rect">
+            <a:avLst/>
+          </a:prstGeom>
+          <a:noFill/>
+          <a:extLst>
+            <a:ext uri="{909E8E84-426E-40DD-AFC4-6F175D3DCCD1}">
+              <a14:hiddenFill xmlns:a14="http://schemas.microsoft.com/office/drawing/2010/main">
+                <a:solidFill>
+                  <a:srgbClr val="FFFFFF"/>
+                </a:solidFill>
+              </a14:hiddenFill>
+            </a:ext>
+          </a:extLst>
+        </p:spPr>
+      </p:pic>
     </p:spTree>
     <p:extLst>
       <p:ext uri="{BB962C8B-B14F-4D97-AF65-F5344CB8AC3E}">
@@ -7581,9 +10429,16 @@
             <p:ph type="title"/>
           </p:nvPr>
         </p:nvSpPr>
-        <p:spPr/>
+        <p:spPr>
+          <a:xfrm>
+            <a:off x="287042" y="872797"/>
+            <a:ext cx="4496831" cy="766432"/>
+          </a:xfrm>
+        </p:spPr>
         <p:txBody>
-          <a:bodyPr/>
+          <a:bodyPr>
+            <a:normAutofit fontScale="90000"/>
+          </a:bodyPr>
           <a:lstStyle/>
           <a:p>
             <a:r>
@@ -8359,6 +11214,51 @@
           </a:prstGeom>
         </p:spPr>
       </p:pic>
+      <p:pic>
+        <p:nvPicPr>
+          <p:cNvPr id="7" name="Picture 2" descr="Image associée">
+            <a:extLst>
+              <a:ext uri="{FF2B5EF4-FFF2-40B4-BE49-F238E27FC236}">
+                <a16:creationId xmlns:a16="http://schemas.microsoft.com/office/drawing/2014/main" id="{0D70B7B2-5CF2-4E69-B68B-58C46E2FBCEE}"/>
+              </a:ext>
+            </a:extLst>
+          </p:cNvPr>
+          <p:cNvPicPr>
+            <a:picLocks noChangeAspect="1" noChangeArrowheads="1"/>
+          </p:cNvPicPr>
+          <p:nvPr/>
+        </p:nvPicPr>
+        <p:blipFill rotWithShape="1">
+          <a:blip r:embed="rId4">
+            <a:extLst>
+              <a:ext uri="{28A0092B-C50C-407E-A947-70E740481C1C}">
+                <a14:useLocalDpi xmlns:a14="http://schemas.microsoft.com/office/drawing/2010/main" val="0"/>
+              </a:ext>
+            </a:extLst>
+          </a:blip>
+          <a:srcRect l="18677" r="15441"/>
+          <a:stretch/>
+        </p:blipFill>
+        <p:spPr bwMode="auto">
+          <a:xfrm>
+            <a:off x="143436" y="143435"/>
+            <a:ext cx="2269635" cy="609600"/>
+          </a:xfrm>
+          <a:prstGeom prst="rect">
+            <a:avLst/>
+          </a:prstGeom>
+          <a:noFill/>
+          <a:extLst>
+            <a:ext uri="{909E8E84-426E-40DD-AFC4-6F175D3DCCD1}">
+              <a14:hiddenFill xmlns:a14="http://schemas.microsoft.com/office/drawing/2010/main">
+                <a:solidFill>
+                  <a:srgbClr val="FFFFFF"/>
+                </a:solidFill>
+              </a14:hiddenFill>
+            </a:ext>
+          </a:extLst>
+        </p:spPr>
+      </p:pic>
     </p:spTree>
     <p:extLst>
       <p:ext uri="{BB962C8B-B14F-4D97-AF65-F5344CB8AC3E}">
@@ -8405,7 +11305,12 @@
             <p:ph type="title"/>
           </p:nvPr>
         </p:nvSpPr>
-        <p:spPr/>
+        <p:spPr>
+          <a:xfrm>
+            <a:off x="677334" y="885534"/>
+            <a:ext cx="8596668" cy="609600"/>
+          </a:xfrm>
+        </p:spPr>
         <p:txBody>
           <a:bodyPr>
             <a:normAutofit fontScale="90000"/>
@@ -8414,15 +11319,7 @@
           <a:p>
             <a:r>
               <a:rPr lang="fr-FR" dirty="0"/>
-              <a:t>Affichage de l’énigme et </a:t>
-            </a:r>
-            <a:r>
-              <a:rPr lang="fr-FR" dirty="0" err="1"/>
-              <a:t>Activage</a:t>
-            </a:r>
-            <a:r>
-              <a:rPr lang="fr-FR" dirty="0"/>
-              <a:t> du buzzer</a:t>
+              <a:t>Afficher l’énigme et Activer le buzzer</a:t>
             </a:r>
             <a:br>
               <a:rPr lang="fr-FR" dirty="0"/>
@@ -8582,6 +11479,51 @@
           </a:p>
         </p:txBody>
       </p:sp>
+      <p:pic>
+        <p:nvPicPr>
+          <p:cNvPr id="4" name="Picture 2" descr="Image associée">
+            <a:extLst>
+              <a:ext uri="{FF2B5EF4-FFF2-40B4-BE49-F238E27FC236}">
+                <a16:creationId xmlns:a16="http://schemas.microsoft.com/office/drawing/2014/main" id="{6D206EC4-81F2-4B71-B604-CF7155CC7DBE}"/>
+              </a:ext>
+            </a:extLst>
+          </p:cNvPr>
+          <p:cNvPicPr>
+            <a:picLocks noChangeAspect="1" noChangeArrowheads="1"/>
+          </p:cNvPicPr>
+          <p:nvPr/>
+        </p:nvPicPr>
+        <p:blipFill rotWithShape="1">
+          <a:blip r:embed="rId2">
+            <a:extLst>
+              <a:ext uri="{28A0092B-C50C-407E-A947-70E740481C1C}">
+                <a14:useLocalDpi xmlns:a14="http://schemas.microsoft.com/office/drawing/2010/main" val="0"/>
+              </a:ext>
+            </a:extLst>
+          </a:blip>
+          <a:srcRect l="18677" r="15441"/>
+          <a:stretch/>
+        </p:blipFill>
+        <p:spPr bwMode="auto">
+          <a:xfrm>
+            <a:off x="143436" y="143435"/>
+            <a:ext cx="2269635" cy="609600"/>
+          </a:xfrm>
+          <a:prstGeom prst="rect">
+            <a:avLst/>
+          </a:prstGeom>
+          <a:noFill/>
+          <a:extLst>
+            <a:ext uri="{909E8E84-426E-40DD-AFC4-6F175D3DCCD1}">
+              <a14:hiddenFill xmlns:a14="http://schemas.microsoft.com/office/drawing/2010/main">
+                <a:solidFill>
+                  <a:srgbClr val="FFFFFF"/>
+                </a:solidFill>
+              </a14:hiddenFill>
+            </a:ext>
+          </a:extLst>
+        </p:spPr>
+      </p:pic>
     </p:spTree>
     <p:extLst>
       <p:ext uri="{BB962C8B-B14F-4D97-AF65-F5344CB8AC3E}">
@@ -8598,6 +11540,14 @@
 <file path=ppt/slides/slide2.xml><?xml version="1.0" encoding="utf-8"?>
 <p:sld xmlns:a="http://schemas.openxmlformats.org/drawingml/2006/main" xmlns:r="http://schemas.openxmlformats.org/officeDocument/2006/relationships" xmlns:p="http://schemas.openxmlformats.org/presentationml/2006/main">
   <p:cSld>
+    <p:bg>
+      <p:bgPr>
+        <a:solidFill>
+          <a:schemeClr val="bg1"/>
+        </a:solidFill>
+        <a:effectLst/>
+      </p:bgPr>
+    </p:bg>
     <p:spTree>
       <p:nvGrpSpPr>
         <p:cNvPr id="1" name=""/>
@@ -8612,6 +11562,41 @@
           <a:chExt cx="0" cy="0"/>
         </a:xfrm>
       </p:grpSpPr>
+      <p:sp>
+        <p:nvSpPr>
+          <p:cNvPr id="4" name="Titre 1">
+            <a:extLst>
+              <a:ext uri="{FF2B5EF4-FFF2-40B4-BE49-F238E27FC236}">
+                <a16:creationId xmlns:a16="http://schemas.microsoft.com/office/drawing/2014/main" id="{C21B4BF8-DA2B-4767-A149-42BD154646C9}"/>
+              </a:ext>
+            </a:extLst>
+          </p:cNvPr>
+          <p:cNvSpPr>
+            <a:spLocks noGrp="1"/>
+          </p:cNvSpPr>
+          <p:nvPr>
+            <p:ph type="title"/>
+          </p:nvPr>
+        </p:nvSpPr>
+        <p:spPr>
+          <a:xfrm>
+            <a:off x="677863" y="966439"/>
+            <a:ext cx="8596668" cy="1320800"/>
+          </a:xfrm>
+        </p:spPr>
+        <p:txBody>
+          <a:bodyPr>
+            <a:normAutofit/>
+          </a:bodyPr>
+          <a:lstStyle/>
+          <a:p>
+            <a:r>
+              <a:rPr lang="fr-FR" sz="4400" dirty="0"/>
+              <a:t>Deux grandes parties </a:t>
+            </a:r>
+          </a:p>
+        </p:txBody>
+      </p:sp>
       <p:pic>
         <p:nvPicPr>
           <p:cNvPr id="1026" name="Picture 2" descr="Image associée">
@@ -8657,92 +11642,37 @@
           </a:extLst>
         </p:spPr>
       </p:pic>
-      <p:sp>
-        <p:nvSpPr>
-          <p:cNvPr id="4" name="Titre 1">
+      <p:graphicFrame>
+        <p:nvGraphicFramePr>
+          <p:cNvPr id="1030" name="Espace réservé du contenu 2">
             <a:extLst>
               <a:ext uri="{FF2B5EF4-FFF2-40B4-BE49-F238E27FC236}">
-                <a16:creationId xmlns:a16="http://schemas.microsoft.com/office/drawing/2014/main" id="{C21B4BF8-DA2B-4767-A149-42BD154646C9}"/>
+                <a16:creationId xmlns:a16="http://schemas.microsoft.com/office/drawing/2014/main" id="{44AF144D-331C-47FF-9D83-0FE443A7498D}"/>
               </a:ext>
             </a:extLst>
           </p:cNvPr>
-          <p:cNvSpPr>
-            <a:spLocks noGrp="1"/>
-          </p:cNvSpPr>
-          <p:nvPr>
-            <p:ph type="title"/>
-          </p:nvPr>
-        </p:nvSpPr>
-        <p:spPr>
-          <a:xfrm>
-            <a:off x="2413071" y="945229"/>
-            <a:ext cx="4627809" cy="709835"/>
-          </a:xfrm>
-        </p:spPr>
-        <p:txBody>
-          <a:bodyPr/>
-          <a:lstStyle/>
-          <a:p>
-            <a:r>
-              <a:rPr lang="fr-FR" dirty="0"/>
-              <a:t>Deux grandes parties </a:t>
-            </a:r>
-          </a:p>
-        </p:txBody>
-      </p:sp>
-      <p:sp>
-        <p:nvSpPr>
-          <p:cNvPr id="5" name="Espace réservé du contenu 2">
-            <a:extLst>
-              <a:ext uri="{FF2B5EF4-FFF2-40B4-BE49-F238E27FC236}">
-                <a16:creationId xmlns:a16="http://schemas.microsoft.com/office/drawing/2014/main" id="{C0A851BD-265D-40D7-A2BC-FB2E4F3C8683}"/>
-              </a:ext>
-            </a:extLst>
-          </p:cNvPr>
-          <p:cNvSpPr>
-            <a:spLocks noGrp="1"/>
-          </p:cNvSpPr>
+          <p:cNvGraphicFramePr>
+            <a:graphicFrameLocks noGrp="1"/>
+          </p:cNvGraphicFramePr>
           <p:nvPr>
             <p:ph idx="1"/>
+            <p:extLst>
+              <p:ext uri="{D42A27DB-BD31-4B8C-83A1-F6EECF244321}">
+                <p14:modId xmlns:p14="http://schemas.microsoft.com/office/powerpoint/2010/main" val="3338563066"/>
+              </p:ext>
+            </p:extLst>
           </p:nvPr>
-        </p:nvSpPr>
-        <p:spPr>
-          <a:xfrm>
-            <a:off x="581406" y="2060480"/>
-            <a:ext cx="10515600" cy="4351338"/>
-          </a:xfrm>
-        </p:spPr>
-        <p:txBody>
-          <a:bodyPr/>
-          <a:lstStyle/>
-          <a:p>
-            <a:pPr marL="571500" indent="-571500">
-              <a:buClr>
-                <a:srgbClr val="7030A0"/>
-              </a:buClr>
-              <a:buFont typeface="+mj-lt"/>
-              <a:buAutoNum type="romanUcPeriod"/>
-            </a:pPr>
-            <a:r>
-              <a:rPr lang="fr-FR" sz="2400" dirty="0"/>
-              <a:t>Développement web </a:t>
-            </a:r>
-          </a:p>
-          <a:p>
-            <a:pPr marL="571500" indent="-571500">
-              <a:buClr>
-                <a:srgbClr val="7030A0"/>
-              </a:buClr>
-              <a:buFont typeface="+mj-lt"/>
-              <a:buAutoNum type="romanUcPeriod"/>
-            </a:pPr>
-            <a:r>
-              <a:rPr lang="fr-FR" sz="2400" dirty="0"/>
-              <a:t>Développement sur Arduino </a:t>
-            </a:r>
-          </a:p>
-        </p:txBody>
-      </p:sp>
+        </p:nvGraphicFramePr>
+        <p:xfrm>
+          <a:off x="677863" y="2160588"/>
+          <a:ext cx="8596312" cy="3881437"/>
+        </p:xfrm>
+        <a:graphic>
+          <a:graphicData uri="http://schemas.openxmlformats.org/drawingml/2006/diagram">
+            <dgm:relIds xmlns:dgm="http://schemas.openxmlformats.org/drawingml/2006/diagram" xmlns:r="http://schemas.openxmlformats.org/officeDocument/2006/relationships" r:dm="rId3" r:lo="rId4" r:qs="rId5" r:cs="rId6"/>
+          </a:graphicData>
+        </a:graphic>
+      </p:graphicFrame>
     </p:spTree>
     <p:extLst>
       <p:ext uri="{BB962C8B-B14F-4D97-AF65-F5344CB8AC3E}">
@@ -8771,6 +11701,14 @@
 <file path=ppt/slides/slide3.xml><?xml version="1.0" encoding="utf-8"?>
 <p:sld xmlns:a="http://schemas.openxmlformats.org/drawingml/2006/main" xmlns:r="http://schemas.openxmlformats.org/officeDocument/2006/relationships" xmlns:p="http://schemas.openxmlformats.org/presentationml/2006/main">
   <p:cSld>
+    <p:bg>
+      <p:bgPr>
+        <a:solidFill>
+          <a:schemeClr val="bg1"/>
+        </a:solidFill>
+        <a:effectLst/>
+      </p:bgPr>
+    </p:bg>
     <p:spTree>
       <p:nvGrpSpPr>
         <p:cNvPr id="1" name=""/>
@@ -8785,6 +11723,151 @@
           <a:chExt cx="0" cy="0"/>
         </a:xfrm>
       </p:grpSpPr>
+      <p:sp>
+        <p:nvSpPr>
+          <p:cNvPr id="4" name="Titre 1">
+            <a:extLst>
+              <a:ext uri="{FF2B5EF4-FFF2-40B4-BE49-F238E27FC236}">
+                <a16:creationId xmlns:a16="http://schemas.microsoft.com/office/drawing/2014/main" id="{67ADF1A8-F2D1-4ED6-AA68-AF9A765E1A51}"/>
+              </a:ext>
+            </a:extLst>
+          </p:cNvPr>
+          <p:cNvSpPr>
+            <a:spLocks noGrp="1"/>
+          </p:cNvSpPr>
+          <p:nvPr>
+            <p:ph type="title"/>
+          </p:nvPr>
+        </p:nvSpPr>
+        <p:spPr>
+          <a:xfrm>
+            <a:off x="710788" y="839789"/>
+            <a:ext cx="4976334" cy="732533"/>
+          </a:xfrm>
+        </p:spPr>
+        <p:txBody>
+          <a:bodyPr anchor="t">
+            <a:normAutofit/>
+          </a:bodyPr>
+          <a:lstStyle/>
+          <a:p>
+            <a:r>
+              <a:rPr lang="fr-FR" dirty="0"/>
+              <a:t>Développement web </a:t>
+            </a:r>
+          </a:p>
+        </p:txBody>
+      </p:sp>
+      <p:pic>
+        <p:nvPicPr>
+          <p:cNvPr id="2" name="Image 1">
+            <a:extLst>
+              <a:ext uri="{FF2B5EF4-FFF2-40B4-BE49-F238E27FC236}">
+                <a16:creationId xmlns:a16="http://schemas.microsoft.com/office/drawing/2014/main" id="{38696793-F247-469E-96E6-6F92AFB1DEAF}"/>
+              </a:ext>
+            </a:extLst>
+          </p:cNvPr>
+          <p:cNvPicPr>
+            <a:picLocks noChangeAspect="1"/>
+          </p:cNvPicPr>
+          <p:nvPr/>
+        </p:nvPicPr>
+        <p:blipFill rotWithShape="1">
+          <a:blip r:embed="rId2"/>
+          <a:srcRect t="70059" b="-1"/>
+          <a:stretch/>
+        </p:blipFill>
+        <p:spPr>
+          <a:xfrm>
+            <a:off x="254507" y="2551542"/>
+            <a:ext cx="5980072" cy="2376059"/>
+          </a:xfrm>
+          <a:prstGeom prst="rect">
+            <a:avLst/>
+          </a:prstGeom>
+        </p:spPr>
+      </p:pic>
+      <p:sp>
+        <p:nvSpPr>
+          <p:cNvPr id="3" name="Espace réservé du contenu 2">
+            <a:extLst>
+              <a:ext uri="{FF2B5EF4-FFF2-40B4-BE49-F238E27FC236}">
+                <a16:creationId xmlns:a16="http://schemas.microsoft.com/office/drawing/2014/main" id="{645F624B-AC52-41BE-BB4C-47B41B395AF9}"/>
+              </a:ext>
+            </a:extLst>
+          </p:cNvPr>
+          <p:cNvSpPr>
+            <a:spLocks noGrp="1"/>
+          </p:cNvSpPr>
+          <p:nvPr>
+            <p:ph idx="1"/>
+          </p:nvPr>
+        </p:nvSpPr>
+        <p:spPr>
+          <a:xfrm>
+            <a:off x="6416039" y="2160589"/>
+            <a:ext cx="3508546" cy="3880773"/>
+          </a:xfrm>
+        </p:spPr>
+        <p:txBody>
+          <a:bodyPr>
+            <a:normAutofit/>
+          </a:bodyPr>
+          <a:lstStyle/>
+          <a:p>
+            <a:pPr marL="571500" indent="-571500">
+              <a:buClr>
+                <a:schemeClr val="accent4"/>
+              </a:buClr>
+              <a:buFont typeface="+mj-lt"/>
+              <a:buAutoNum type="romanUcPeriod"/>
+            </a:pPr>
+            <a:r>
+              <a:rPr lang="fr-FR" sz="2400" dirty="0"/>
+              <a:t>Création de la page web </a:t>
+            </a:r>
+          </a:p>
+          <a:p>
+            <a:pPr marL="571500" indent="-571500">
+              <a:buClr>
+                <a:schemeClr val="accent4"/>
+              </a:buClr>
+              <a:buFont typeface="+mj-lt"/>
+              <a:buAutoNum type="romanUcPeriod"/>
+            </a:pPr>
+            <a:r>
+              <a:rPr lang="fr-FR" sz="2400" dirty="0"/>
+              <a:t>Création de la page d’authentification</a:t>
+            </a:r>
+          </a:p>
+          <a:p>
+            <a:pPr marL="571500" indent="-571500">
+              <a:buClr>
+                <a:schemeClr val="accent4"/>
+              </a:buClr>
+              <a:buFont typeface="+mj-lt"/>
+              <a:buAutoNum type="romanUcPeriod"/>
+            </a:pPr>
+            <a:r>
+              <a:rPr lang="fr-FR" sz="2400" dirty="0"/>
+              <a:t>Gérer les comptes superviseurs</a:t>
+            </a:r>
+          </a:p>
+          <a:p>
+            <a:pPr marL="571500" indent="-571500">
+              <a:buClr>
+                <a:schemeClr val="accent4"/>
+              </a:buClr>
+              <a:buFont typeface="+mj-lt"/>
+              <a:buAutoNum type="romanUcPeriod"/>
+            </a:pPr>
+            <a:r>
+              <a:rPr lang="fr-FR" sz="2400" dirty="0"/>
+              <a:t>Gérer les créneaux </a:t>
+            </a:r>
+          </a:p>
+        </p:txBody>
+      </p:sp>
       <p:pic>
         <p:nvPicPr>
           <p:cNvPr id="1026" name="Picture 2" descr="Image associée">
@@ -8800,7 +11883,7 @@
           <p:nvPr/>
         </p:nvPicPr>
         <p:blipFill rotWithShape="1">
-          <a:blip r:embed="rId2">
+          <a:blip r:embed="rId3">
             <a:extLst>
               <a:ext uri="{28A0092B-C50C-407E-A947-70E740481C1C}">
                 <a14:useLocalDpi xmlns:a14="http://schemas.microsoft.com/office/drawing/2010/main" val="0"/>
@@ -8830,120 +11913,6 @@
           </a:extLst>
         </p:spPr>
       </p:pic>
-      <p:sp>
-        <p:nvSpPr>
-          <p:cNvPr id="3" name="Espace réservé du contenu 2">
-            <a:extLst>
-              <a:ext uri="{FF2B5EF4-FFF2-40B4-BE49-F238E27FC236}">
-                <a16:creationId xmlns:a16="http://schemas.microsoft.com/office/drawing/2014/main" id="{645F624B-AC52-41BE-BB4C-47B41B395AF9}"/>
-              </a:ext>
-            </a:extLst>
-          </p:cNvPr>
-          <p:cNvSpPr>
-            <a:spLocks noGrp="1"/>
-          </p:cNvSpPr>
-          <p:nvPr>
-            <p:ph idx="1"/>
-          </p:nvPr>
-        </p:nvSpPr>
-        <p:spPr>
-          <a:xfrm>
-            <a:off x="637032" y="2460118"/>
-            <a:ext cx="6541008" cy="2386202"/>
-          </a:xfrm>
-        </p:spPr>
-        <p:txBody>
-          <a:bodyPr>
-            <a:normAutofit/>
-          </a:bodyPr>
-          <a:lstStyle/>
-          <a:p>
-            <a:pPr marL="571500" indent="-571500">
-              <a:buClr>
-                <a:schemeClr val="accent4"/>
-              </a:buClr>
-              <a:buFont typeface="+mj-lt"/>
-              <a:buAutoNum type="romanUcPeriod"/>
-            </a:pPr>
-            <a:r>
-              <a:rPr lang="fr-FR" sz="2400" dirty="0"/>
-              <a:t>Création de la page web </a:t>
-            </a:r>
-          </a:p>
-          <a:p>
-            <a:pPr marL="571500" indent="-571500">
-              <a:buClr>
-                <a:schemeClr val="accent4"/>
-              </a:buClr>
-              <a:buFont typeface="+mj-lt"/>
-              <a:buAutoNum type="romanUcPeriod"/>
-            </a:pPr>
-            <a:r>
-              <a:rPr lang="fr-FR" sz="2400" dirty="0"/>
-              <a:t>Création de la page d’authentification</a:t>
-            </a:r>
-          </a:p>
-          <a:p>
-            <a:pPr marL="571500" indent="-571500">
-              <a:buClr>
-                <a:schemeClr val="accent4"/>
-              </a:buClr>
-              <a:buFont typeface="+mj-lt"/>
-              <a:buAutoNum type="romanUcPeriod"/>
-            </a:pPr>
-            <a:r>
-              <a:rPr lang="fr-FR" sz="2400" dirty="0"/>
-              <a:t>Gérer les comptes superviseurs</a:t>
-            </a:r>
-          </a:p>
-          <a:p>
-            <a:pPr marL="571500" indent="-571500">
-              <a:buClr>
-                <a:schemeClr val="accent4"/>
-              </a:buClr>
-              <a:buFont typeface="+mj-lt"/>
-              <a:buAutoNum type="romanUcPeriod"/>
-            </a:pPr>
-            <a:r>
-              <a:rPr lang="fr-FR" sz="2400" dirty="0"/>
-              <a:t>Gérer les créneaux </a:t>
-            </a:r>
-          </a:p>
-        </p:txBody>
-      </p:sp>
-      <p:sp>
-        <p:nvSpPr>
-          <p:cNvPr id="4" name="Titre 1">
-            <a:extLst>
-              <a:ext uri="{FF2B5EF4-FFF2-40B4-BE49-F238E27FC236}">
-                <a16:creationId xmlns:a16="http://schemas.microsoft.com/office/drawing/2014/main" id="{67ADF1A8-F2D1-4ED6-AA68-AF9A765E1A51}"/>
-              </a:ext>
-            </a:extLst>
-          </p:cNvPr>
-          <p:cNvSpPr>
-            <a:spLocks noGrp="1"/>
-          </p:cNvSpPr>
-          <p:nvPr>
-            <p:ph type="title"/>
-          </p:nvPr>
-        </p:nvSpPr>
-        <p:spPr>
-          <a:xfrm>
-            <a:off x="838200" y="1134555"/>
-            <a:ext cx="10515600" cy="1325563"/>
-          </a:xfrm>
-        </p:spPr>
-        <p:txBody>
-          <a:bodyPr/>
-          <a:lstStyle/>
-          <a:p>
-            <a:r>
-              <a:rPr lang="fr-FR" dirty="0"/>
-              <a:t>Développement web </a:t>
-            </a:r>
-          </a:p>
-        </p:txBody>
-      </p:sp>
     </p:spTree>
     <p:extLst>
       <p:ext uri="{BB962C8B-B14F-4D97-AF65-F5344CB8AC3E}">
@@ -9002,7 +11971,12 @@
             <p:ph type="title"/>
           </p:nvPr>
         </p:nvSpPr>
-        <p:spPr/>
+        <p:spPr>
+          <a:xfrm>
+            <a:off x="677334" y="839789"/>
+            <a:ext cx="8596668" cy="1320800"/>
+          </a:xfrm>
+        </p:spPr>
         <p:txBody>
           <a:bodyPr/>
           <a:lstStyle/>
@@ -9072,6 +12046,51 @@
           </a:p>
         </p:txBody>
       </p:sp>
+      <p:pic>
+        <p:nvPicPr>
+          <p:cNvPr id="4" name="Picture 2" descr="Image associée">
+            <a:extLst>
+              <a:ext uri="{FF2B5EF4-FFF2-40B4-BE49-F238E27FC236}">
+                <a16:creationId xmlns:a16="http://schemas.microsoft.com/office/drawing/2014/main" id="{AD07FE0C-BD2D-4F75-8F2D-01CF8AB2C17F}"/>
+              </a:ext>
+            </a:extLst>
+          </p:cNvPr>
+          <p:cNvPicPr>
+            <a:picLocks noChangeAspect="1" noChangeArrowheads="1"/>
+          </p:cNvPicPr>
+          <p:nvPr/>
+        </p:nvPicPr>
+        <p:blipFill rotWithShape="1">
+          <a:blip r:embed="rId2">
+            <a:extLst>
+              <a:ext uri="{28A0092B-C50C-407E-A947-70E740481C1C}">
+                <a14:useLocalDpi xmlns:a14="http://schemas.microsoft.com/office/drawing/2010/main" val="0"/>
+              </a:ext>
+            </a:extLst>
+          </a:blip>
+          <a:srcRect l="18677" r="15441"/>
+          <a:stretch/>
+        </p:blipFill>
+        <p:spPr bwMode="auto">
+          <a:xfrm>
+            <a:off x="143436" y="143435"/>
+            <a:ext cx="2269635" cy="609600"/>
+          </a:xfrm>
+          <a:prstGeom prst="rect">
+            <a:avLst/>
+          </a:prstGeom>
+          <a:noFill/>
+          <a:extLst>
+            <a:ext uri="{909E8E84-426E-40DD-AFC4-6F175D3DCCD1}">
+              <a14:hiddenFill xmlns:a14="http://schemas.microsoft.com/office/drawing/2010/main">
+                <a:solidFill>
+                  <a:srgbClr val="FFFFFF"/>
+                </a:solidFill>
+              </a14:hiddenFill>
+            </a:ext>
+          </a:extLst>
+        </p:spPr>
+      </p:pic>
     </p:spTree>
     <p:extLst>
       <p:ext uri="{BB962C8B-B14F-4D97-AF65-F5344CB8AC3E}">
@@ -9118,7 +12137,12 @@
             <p:ph type="title"/>
           </p:nvPr>
         </p:nvSpPr>
-        <p:spPr/>
+        <p:spPr>
+          <a:xfrm>
+            <a:off x="677334" y="932985"/>
+            <a:ext cx="8596668" cy="1320800"/>
+          </a:xfrm>
+        </p:spPr>
         <p:txBody>
           <a:bodyPr/>
           <a:lstStyle/>
@@ -9225,6 +12249,51 @@
           </a:p>
         </p:txBody>
       </p:sp>
+      <p:pic>
+        <p:nvPicPr>
+          <p:cNvPr id="4" name="Picture 2" descr="Image associée">
+            <a:extLst>
+              <a:ext uri="{FF2B5EF4-FFF2-40B4-BE49-F238E27FC236}">
+                <a16:creationId xmlns:a16="http://schemas.microsoft.com/office/drawing/2014/main" id="{E6611FA9-ACB4-46AF-9473-3B964F119262}"/>
+              </a:ext>
+            </a:extLst>
+          </p:cNvPr>
+          <p:cNvPicPr>
+            <a:picLocks noChangeAspect="1" noChangeArrowheads="1"/>
+          </p:cNvPicPr>
+          <p:nvPr/>
+        </p:nvPicPr>
+        <p:blipFill rotWithShape="1">
+          <a:blip r:embed="rId2">
+            <a:extLst>
+              <a:ext uri="{28A0092B-C50C-407E-A947-70E740481C1C}">
+                <a14:useLocalDpi xmlns:a14="http://schemas.microsoft.com/office/drawing/2010/main" val="0"/>
+              </a:ext>
+            </a:extLst>
+          </a:blip>
+          <a:srcRect l="18677" r="15441"/>
+          <a:stretch/>
+        </p:blipFill>
+        <p:spPr bwMode="auto">
+          <a:xfrm>
+            <a:off x="143436" y="143435"/>
+            <a:ext cx="2269635" cy="609600"/>
+          </a:xfrm>
+          <a:prstGeom prst="rect">
+            <a:avLst/>
+          </a:prstGeom>
+          <a:noFill/>
+          <a:extLst>
+            <a:ext uri="{909E8E84-426E-40DD-AFC4-6F175D3DCCD1}">
+              <a14:hiddenFill xmlns:a14="http://schemas.microsoft.com/office/drawing/2010/main">
+                <a:solidFill>
+                  <a:srgbClr val="FFFFFF"/>
+                </a:solidFill>
+              </a14:hiddenFill>
+            </a:ext>
+          </a:extLst>
+        </p:spPr>
+      </p:pic>
     </p:spTree>
     <p:extLst>
       <p:ext uri="{BB962C8B-B14F-4D97-AF65-F5344CB8AC3E}">
@@ -9273,7 +12342,7 @@
         </p:nvSpPr>
         <p:spPr>
           <a:xfrm>
-            <a:off x="677334" y="609600"/>
+            <a:off x="474346" y="908776"/>
             <a:ext cx="8596668" cy="1320800"/>
           </a:xfrm>
         </p:spPr>
@@ -9282,11 +12351,11 @@
           <a:lstStyle/>
           <a:p>
             <a:r>
-              <a:rPr lang="fr-FR"/>
+              <a:rPr lang="fr-FR" dirty="0"/>
               <a:t>Gérer les comptes superviseurs</a:t>
             </a:r>
             <a:br>
-              <a:rPr lang="fr-FR"/>
+              <a:rPr lang="fr-FR" dirty="0"/>
             </a:br>
             <a:endParaRPr lang="fr-FR" dirty="0"/>
           </a:p>
@@ -9682,6 +12751,51 @@
           </a:p>
         </p:txBody>
       </p:sp>
+      <p:pic>
+        <p:nvPicPr>
+          <p:cNvPr id="7" name="Picture 2" descr="Image associée">
+            <a:extLst>
+              <a:ext uri="{FF2B5EF4-FFF2-40B4-BE49-F238E27FC236}">
+                <a16:creationId xmlns:a16="http://schemas.microsoft.com/office/drawing/2014/main" id="{10BD5979-EA55-4B40-96F8-C54B9624F861}"/>
+              </a:ext>
+            </a:extLst>
+          </p:cNvPr>
+          <p:cNvPicPr>
+            <a:picLocks noChangeAspect="1" noChangeArrowheads="1"/>
+          </p:cNvPicPr>
+          <p:nvPr/>
+        </p:nvPicPr>
+        <p:blipFill rotWithShape="1">
+          <a:blip r:embed="rId3">
+            <a:extLst>
+              <a:ext uri="{28A0092B-C50C-407E-A947-70E740481C1C}">
+                <a14:useLocalDpi xmlns:a14="http://schemas.microsoft.com/office/drawing/2010/main" val="0"/>
+              </a:ext>
+            </a:extLst>
+          </a:blip>
+          <a:srcRect l="18677" r="15441"/>
+          <a:stretch/>
+        </p:blipFill>
+        <p:spPr bwMode="auto">
+          <a:xfrm>
+            <a:off x="143436" y="143435"/>
+            <a:ext cx="2269635" cy="609600"/>
+          </a:xfrm>
+          <a:prstGeom prst="rect">
+            <a:avLst/>
+          </a:prstGeom>
+          <a:noFill/>
+          <a:extLst>
+            <a:ext uri="{909E8E84-426E-40DD-AFC4-6F175D3DCCD1}">
+              <a14:hiddenFill xmlns:a14="http://schemas.microsoft.com/office/drawing/2010/main">
+                <a:solidFill>
+                  <a:srgbClr val="FFFFFF"/>
+                </a:solidFill>
+              </a14:hiddenFill>
+            </a:ext>
+          </a:extLst>
+        </p:spPr>
+      </p:pic>
     </p:spTree>
     <p:extLst>
       <p:ext uri="{BB962C8B-B14F-4D97-AF65-F5344CB8AC3E}">
@@ -9728,7 +12842,12 @@
             <p:ph type="title"/>
           </p:nvPr>
         </p:nvSpPr>
-        <p:spPr/>
+        <p:spPr>
+          <a:xfrm>
+            <a:off x="546066" y="839789"/>
+            <a:ext cx="8596668" cy="1320800"/>
+          </a:xfrm>
+        </p:spPr>
         <p:txBody>
           <a:bodyPr/>
           <a:lstStyle/>
@@ -9853,6 +12972,51 @@
           </a:prstGeom>
         </p:spPr>
       </p:pic>
+      <p:pic>
+        <p:nvPicPr>
+          <p:cNvPr id="5" name="Picture 2" descr="Image associée">
+            <a:extLst>
+              <a:ext uri="{FF2B5EF4-FFF2-40B4-BE49-F238E27FC236}">
+                <a16:creationId xmlns:a16="http://schemas.microsoft.com/office/drawing/2014/main" id="{F7C233E6-3248-4B1F-B309-9991AE61B762}"/>
+              </a:ext>
+            </a:extLst>
+          </p:cNvPr>
+          <p:cNvPicPr>
+            <a:picLocks noChangeAspect="1" noChangeArrowheads="1"/>
+          </p:cNvPicPr>
+          <p:nvPr/>
+        </p:nvPicPr>
+        <p:blipFill rotWithShape="1">
+          <a:blip r:embed="rId3">
+            <a:extLst>
+              <a:ext uri="{28A0092B-C50C-407E-A947-70E740481C1C}">
+                <a14:useLocalDpi xmlns:a14="http://schemas.microsoft.com/office/drawing/2010/main" val="0"/>
+              </a:ext>
+            </a:extLst>
+          </a:blip>
+          <a:srcRect l="18677" r="15441"/>
+          <a:stretch/>
+        </p:blipFill>
+        <p:spPr bwMode="auto">
+          <a:xfrm>
+            <a:off x="143436" y="143435"/>
+            <a:ext cx="2269635" cy="609600"/>
+          </a:xfrm>
+          <a:prstGeom prst="rect">
+            <a:avLst/>
+          </a:prstGeom>
+          <a:noFill/>
+          <a:extLst>
+            <a:ext uri="{909E8E84-426E-40DD-AFC4-6F175D3DCCD1}">
+              <a14:hiddenFill xmlns:a14="http://schemas.microsoft.com/office/drawing/2010/main">
+                <a:solidFill>
+                  <a:srgbClr val="FFFFFF"/>
+                </a:solidFill>
+              </a14:hiddenFill>
+            </a:ext>
+          </a:extLst>
+        </p:spPr>
+      </p:pic>
     </p:spTree>
     <p:extLst>
       <p:ext uri="{BB962C8B-B14F-4D97-AF65-F5344CB8AC3E}">
@@ -9869,6 +13033,14 @@
 <file path=ppt/slides/slide8.xml><?xml version="1.0" encoding="utf-8"?>
 <p:sld xmlns:a="http://schemas.openxmlformats.org/drawingml/2006/main" xmlns:r="http://schemas.openxmlformats.org/officeDocument/2006/relationships" xmlns:p="http://schemas.openxmlformats.org/presentationml/2006/main">
   <p:cSld>
+    <p:bg>
+      <p:bgPr>
+        <a:solidFill>
+          <a:schemeClr val="bg1"/>
+        </a:solidFill>
+        <a:effectLst/>
+      </p:bgPr>
+    </p:bg>
     <p:spTree>
       <p:nvGrpSpPr>
         <p:cNvPr id="1" name=""/>
@@ -9899,9 +13071,16 @@
             <p:ph type="title"/>
           </p:nvPr>
         </p:nvSpPr>
-        <p:spPr/>
+        <p:spPr>
+          <a:xfrm>
+            <a:off x="681087" y="751304"/>
+            <a:ext cx="3729076" cy="1320800"/>
+          </a:xfrm>
+        </p:spPr>
         <p:txBody>
-          <a:bodyPr/>
+          <a:bodyPr anchor="ctr">
+            <a:normAutofit/>
+          </a:bodyPr>
           <a:lstStyle/>
           <a:p>
             <a:r>
@@ -9927,7 +13106,12 @@
             <p:ph idx="1"/>
           </p:nvPr>
         </p:nvSpPr>
-        <p:spPr/>
+        <p:spPr>
+          <a:xfrm>
+            <a:off x="685167" y="2160589"/>
+            <a:ext cx="3720916" cy="3560733"/>
+          </a:xfrm>
+        </p:spPr>
         <p:txBody>
           <a:bodyPr>
             <a:normAutofit/>
@@ -9940,7 +13124,7 @@
               </a:buClr>
             </a:pPr>
             <a:r>
-              <a:rPr lang="fr-FR" sz="2400" dirty="0"/>
+              <a:rPr lang="fr-FR" dirty="0"/>
               <a:t>Connexion du pavé numérique</a:t>
             </a:r>
           </a:p>
@@ -9951,7 +13135,7 @@
               </a:buClr>
             </a:pPr>
             <a:r>
-              <a:rPr lang="fr-FR" sz="2400" dirty="0"/>
+              <a:rPr lang="fr-FR" dirty="0"/>
               <a:t>Connexion de l’afficheur </a:t>
             </a:r>
           </a:p>
@@ -9962,7 +13146,7 @@
               </a:buClr>
             </a:pPr>
             <a:r>
-              <a:rPr lang="fr-FR" sz="2400" dirty="0"/>
+              <a:rPr lang="fr-FR" dirty="0"/>
               <a:t>Connexion du buzzer</a:t>
             </a:r>
           </a:p>
@@ -9973,20 +13157,86 @@
               </a:buClr>
             </a:pPr>
             <a:r>
-              <a:rPr lang="fr-FR" sz="2400" dirty="0"/>
-              <a:t>Affichage de l’énigme et </a:t>
-            </a:r>
-            <a:r>
-              <a:rPr lang="fr-FR" sz="2400" dirty="0" err="1"/>
-              <a:t>Activage</a:t>
-            </a:r>
-            <a:r>
-              <a:rPr lang="fr-FR" sz="2400" dirty="0"/>
-              <a:t> du buzzer</a:t>
+              <a:rPr lang="fr-FR" dirty="0"/>
+              <a:t>Afficher l’énigme et activer le buzzer</a:t>
             </a:r>
           </a:p>
         </p:txBody>
       </p:sp>
+      <p:pic>
+        <p:nvPicPr>
+          <p:cNvPr id="4" name="Image 3">
+            <a:extLst>
+              <a:ext uri="{FF2B5EF4-FFF2-40B4-BE49-F238E27FC236}">
+                <a16:creationId xmlns:a16="http://schemas.microsoft.com/office/drawing/2014/main" id="{CA5A89C8-0DD0-447C-89DB-C085420B56E2}"/>
+              </a:ext>
+            </a:extLst>
+          </p:cNvPr>
+          <p:cNvPicPr>
+            <a:picLocks noChangeAspect="1"/>
+          </p:cNvPicPr>
+          <p:nvPr/>
+        </p:nvPicPr>
+        <p:blipFill rotWithShape="1">
+          <a:blip r:embed="rId2"/>
+          <a:srcRect l="491" t="754" r="2507" b="50850"/>
+          <a:stretch/>
+        </p:blipFill>
+        <p:spPr>
+          <a:xfrm>
+            <a:off x="4405822" y="1501920"/>
+            <a:ext cx="5564222" cy="3560733"/>
+          </a:xfrm>
+          <a:prstGeom prst="rect">
+            <a:avLst/>
+          </a:prstGeom>
+        </p:spPr>
+      </p:pic>
+      <p:pic>
+        <p:nvPicPr>
+          <p:cNvPr id="19" name="Picture 2" descr="Image associée">
+            <a:extLst>
+              <a:ext uri="{FF2B5EF4-FFF2-40B4-BE49-F238E27FC236}">
+                <a16:creationId xmlns:a16="http://schemas.microsoft.com/office/drawing/2014/main" id="{68310222-BB95-4566-8E7F-CDE0179E203A}"/>
+              </a:ext>
+            </a:extLst>
+          </p:cNvPr>
+          <p:cNvPicPr>
+            <a:picLocks noChangeAspect="1" noChangeArrowheads="1"/>
+          </p:cNvPicPr>
+          <p:nvPr/>
+        </p:nvPicPr>
+        <p:blipFill rotWithShape="1">
+          <a:blip r:embed="rId3">
+            <a:extLst>
+              <a:ext uri="{28A0092B-C50C-407E-A947-70E740481C1C}">
+                <a14:useLocalDpi xmlns:a14="http://schemas.microsoft.com/office/drawing/2010/main" val="0"/>
+              </a:ext>
+            </a:extLst>
+          </a:blip>
+          <a:srcRect l="18677" r="15441"/>
+          <a:stretch/>
+        </p:blipFill>
+        <p:spPr bwMode="auto">
+          <a:xfrm>
+            <a:off x="143436" y="143435"/>
+            <a:ext cx="2269635" cy="609600"/>
+          </a:xfrm>
+          <a:prstGeom prst="rect">
+            <a:avLst/>
+          </a:prstGeom>
+          <a:noFill/>
+          <a:extLst>
+            <a:ext uri="{909E8E84-426E-40DD-AFC4-6F175D3DCCD1}">
+              <a14:hiddenFill xmlns:a14="http://schemas.microsoft.com/office/drawing/2010/main">
+                <a:solidFill>
+                  <a:srgbClr val="FFFFFF"/>
+                </a:solidFill>
+              </a14:hiddenFill>
+            </a:ext>
+          </a:extLst>
+        </p:spPr>
+      </p:pic>
     </p:spTree>
     <p:extLst>
       <p:ext uri="{BB962C8B-B14F-4D97-AF65-F5344CB8AC3E}">
@@ -10033,7 +13283,12 @@
             <p:ph type="title"/>
           </p:nvPr>
         </p:nvSpPr>
-        <p:spPr/>
+        <p:spPr>
+          <a:xfrm>
+            <a:off x="143436" y="914632"/>
+            <a:ext cx="8596668" cy="1320800"/>
+          </a:xfrm>
+        </p:spPr>
         <p:txBody>
           <a:bodyPr/>
           <a:lstStyle/>
@@ -10410,6 +13665,51 @@
           <a:prstGeom prst="rect">
             <a:avLst/>
           </a:prstGeom>
+        </p:spPr>
+      </p:pic>
+      <p:pic>
+        <p:nvPicPr>
+          <p:cNvPr id="8" name="Picture 2" descr="Image associée">
+            <a:extLst>
+              <a:ext uri="{FF2B5EF4-FFF2-40B4-BE49-F238E27FC236}">
+                <a16:creationId xmlns:a16="http://schemas.microsoft.com/office/drawing/2014/main" id="{4B20E71C-E7D2-49CF-9E2A-461F6DEFA0EC}"/>
+              </a:ext>
+            </a:extLst>
+          </p:cNvPr>
+          <p:cNvPicPr>
+            <a:picLocks noChangeAspect="1" noChangeArrowheads="1"/>
+          </p:cNvPicPr>
+          <p:nvPr/>
+        </p:nvPicPr>
+        <p:blipFill rotWithShape="1">
+          <a:blip r:embed="rId4">
+            <a:extLst>
+              <a:ext uri="{28A0092B-C50C-407E-A947-70E740481C1C}">
+                <a14:useLocalDpi xmlns:a14="http://schemas.microsoft.com/office/drawing/2010/main" val="0"/>
+              </a:ext>
+            </a:extLst>
+          </a:blip>
+          <a:srcRect l="18677" r="15441"/>
+          <a:stretch/>
+        </p:blipFill>
+        <p:spPr bwMode="auto">
+          <a:xfrm>
+            <a:off x="143436" y="143435"/>
+            <a:ext cx="2269635" cy="609600"/>
+          </a:xfrm>
+          <a:prstGeom prst="rect">
+            <a:avLst/>
+          </a:prstGeom>
+          <a:noFill/>
+          <a:extLst>
+            <a:ext uri="{909E8E84-426E-40DD-AFC4-6F175D3DCCD1}">
+              <a14:hiddenFill xmlns:a14="http://schemas.microsoft.com/office/drawing/2010/main">
+                <a:solidFill>
+                  <a:srgbClr val="FFFFFF"/>
+                </a:solidFill>
+              </a14:hiddenFill>
+            </a:ext>
+          </a:extLst>
         </p:spPr>
       </p:pic>
     </p:spTree>

</xml_diff>

<commit_message>
Maj compte rendu et PowerPoint
</commit_message>
<xml_diff>
--- a/Cyril/Présentation.pptx
+++ b/Cyril/Présentation.pptx
@@ -12027,7 +12027,7 @@
             </a:pPr>
             <a:r>
               <a:rPr lang="fr-FR" dirty="0"/>
-              <a:t>Ergonomie : Permettre au client de réservé un créneau facilement et de naviguer entre les pages facilement (Bootstrap).</a:t>
+              <a:t>Ergonomie : Permettre au client de réservé un créneau facilement et de naviguer entre les pages facilement (Bootstrap, plugins).</a:t>
             </a:r>
           </a:p>
           <a:p>
@@ -12038,7 +12038,7 @@
             </a:pPr>
             <a:r>
               <a:rPr lang="fr-FR" dirty="0"/>
-              <a:t>Pages : Menu, Histoire du téléthon de Tourcoing, Contact, Page de créneaux, Page de connexion.</a:t>
+              <a:t>Pages : Menu, Histoire du téléthon de Tourcoing, Contact, Page pour réserver un créneaux, Page de connexion.</a:t>
             </a:r>
           </a:p>
           <a:p>
@@ -12927,14 +12927,31 @@
             <a:endParaRPr lang="fr-FR" dirty="0"/>
           </a:p>
           <a:p>
+            <a:pPr marL="0" indent="0">
+              <a:buClr>
+                <a:schemeClr val="accent4"/>
+              </a:buClr>
+              <a:buNone/>
+            </a:pPr>
+            <a:endParaRPr lang="fr-FR" dirty="0"/>
+          </a:p>
+          <a:p>
             <a:pPr>
               <a:buClr>
                 <a:schemeClr val="accent4"/>
               </a:buClr>
             </a:pPr>
+            <a:endParaRPr lang="fr-FR" dirty="0"/>
+          </a:p>
+          <a:p>
+            <a:pPr>
+              <a:buClr>
+                <a:schemeClr val="accent4"/>
+              </a:buClr>
+            </a:pPr>
             <a:r>
               <a:rPr lang="fr-FR" dirty="0"/>
-              <a:t>Page de réservation sur le site et formulaire d’inscription (jours, mois, années, nom, nombre de joueurs et numéro de téléphone)</a:t>
+              <a:t>Page de réservation sur le site (nom, prénom, nombre de joueurs, numéro de téléphone, date)</a:t>
             </a:r>
           </a:p>
           <a:p>
@@ -12942,36 +12959,6 @@
           </a:p>
         </p:txBody>
       </p:sp>
-      <p:pic>
-        <p:nvPicPr>
-          <p:cNvPr id="4" name="Image 3">
-            <a:extLst>
-              <a:ext uri="{FF2B5EF4-FFF2-40B4-BE49-F238E27FC236}">
-                <a16:creationId xmlns:a16="http://schemas.microsoft.com/office/drawing/2014/main" id="{8BE0DCC5-F686-4FD0-82E5-AE2555442CE8}"/>
-              </a:ext>
-            </a:extLst>
-          </p:cNvPr>
-          <p:cNvPicPr>
-            <a:picLocks noChangeAspect="1"/>
-          </p:cNvPicPr>
-          <p:nvPr/>
-        </p:nvPicPr>
-        <p:blipFill>
-          <a:blip r:embed="rId2"/>
-          <a:stretch>
-            <a:fillRect/>
-          </a:stretch>
-        </p:blipFill>
-        <p:spPr>
-          <a:xfrm>
-            <a:off x="677334" y="2701402"/>
-            <a:ext cx="8334133" cy="1167995"/>
-          </a:xfrm>
-          <a:prstGeom prst="rect">
-            <a:avLst/>
-          </a:prstGeom>
-        </p:spPr>
-      </p:pic>
       <p:pic>
         <p:nvPicPr>
           <p:cNvPr id="5" name="Picture 2" descr="Image associée">
@@ -12987,7 +12974,7 @@
           <p:nvPr/>
         </p:nvPicPr>
         <p:blipFill rotWithShape="1">
-          <a:blip r:embed="rId3">
+          <a:blip r:embed="rId2">
             <a:extLst>
               <a:ext uri="{28A0092B-C50C-407E-A947-70E740481C1C}">
                 <a14:useLocalDpi xmlns:a14="http://schemas.microsoft.com/office/drawing/2010/main" val="0"/>
@@ -13015,6 +13002,36 @@
               </a14:hiddenFill>
             </a:ext>
           </a:extLst>
+        </p:spPr>
+      </p:pic>
+      <p:pic>
+        <p:nvPicPr>
+          <p:cNvPr id="7" name="Image 6">
+            <a:extLst>
+              <a:ext uri="{FF2B5EF4-FFF2-40B4-BE49-F238E27FC236}">
+                <a16:creationId xmlns:a16="http://schemas.microsoft.com/office/drawing/2014/main" id="{BD60FBA0-9FA7-47B7-A380-BB1A553C9096}"/>
+              </a:ext>
+            </a:extLst>
+          </p:cNvPr>
+          <p:cNvPicPr>
+            <a:picLocks noChangeAspect="1"/>
+          </p:cNvPicPr>
+          <p:nvPr/>
+        </p:nvPicPr>
+        <p:blipFill>
+          <a:blip r:embed="rId3"/>
+          <a:stretch>
+            <a:fillRect/>
+          </a:stretch>
+        </p:blipFill>
+        <p:spPr>
+          <a:xfrm>
+            <a:off x="1278253" y="2798635"/>
+            <a:ext cx="2238375" cy="1571625"/>
+          </a:xfrm>
+          <a:prstGeom prst="rect">
+            <a:avLst/>
+          </a:prstGeom>
         </p:spPr>
       </p:pic>
     </p:spTree>

</xml_diff>